<commit_message>
seams last presentation editted
</commit_message>
<xml_diff>
--- a/POWERPOINTS/Zenabu_SEAMS.pptx
+++ b/POWERPOINTS/Zenabu_SEAMS.pptx
@@ -9,11 +9,12 @@
     <p:sldId id="258" r:id="rId3"/>
     <p:sldId id="257" r:id="rId4"/>
     <p:sldId id="259" r:id="rId5"/>
-    <p:sldId id="261" r:id="rId6"/>
-    <p:sldId id="260" r:id="rId7"/>
+    <p:sldId id="260" r:id="rId6"/>
+    <p:sldId id="265" r:id="rId7"/>
     <p:sldId id="263" r:id="rId8"/>
     <p:sldId id="262" r:id="rId9"/>
-    <p:sldId id="264" r:id="rId10"/>
+    <p:sldId id="261" r:id="rId10"/>
+    <p:sldId id="264" r:id="rId11"/>
   </p:sldIdLst>
   <p:sldSz cx="12192000" cy="6858000"/>
   <p:notesSz cx="6858000" cy="9144000"/>
@@ -3425,6 +3426,193 @@
 </p:sld>
 </file>
 
+<file path=ppt/slides/slide10.xml><?xml version="1.0" encoding="utf-8"?>
+<p:sld xmlns:a="http://schemas.openxmlformats.org/drawingml/2006/main" xmlns:r="http://schemas.openxmlformats.org/officeDocument/2006/relationships" xmlns:p="http://schemas.openxmlformats.org/presentationml/2006/main">
+  <p:cSld>
+    <p:spTree>
+      <p:nvGrpSpPr>
+        <p:cNvPr id="1" name=""/>
+        <p:cNvGrpSpPr/>
+        <p:nvPr/>
+      </p:nvGrpSpPr>
+      <p:grpSpPr>
+        <a:xfrm>
+          <a:off x="0" y="0"/>
+          <a:ext cx="0" cy="0"/>
+          <a:chOff x="0" y="0"/>
+          <a:chExt cx="0" cy="0"/>
+        </a:xfrm>
+      </p:grpSpPr>
+      <p:sp>
+        <p:nvSpPr>
+          <p:cNvPr id="2" name="Title 1"/>
+          <p:cNvSpPr>
+            <a:spLocks noGrp="1"/>
+          </p:cNvSpPr>
+          <p:nvPr>
+            <p:ph type="title"/>
+          </p:nvPr>
+        </p:nvSpPr>
+        <p:spPr/>
+        <p:txBody>
+          <a:bodyPr/>
+          <a:lstStyle/>
+          <a:p>
+            <a:r>
+              <a:rPr lang="en-US" b="1" dirty="0" smtClean="0">
+                <a:solidFill>
+                  <a:schemeClr val="accent2">
+                    <a:lumMod val="75000"/>
+                  </a:schemeClr>
+                </a:solidFill>
+              </a:rPr>
+              <a:t>Acknowledgements</a:t>
+            </a:r>
+            <a:endParaRPr lang="en-ZA" b="1" dirty="0">
+              <a:solidFill>
+                <a:schemeClr val="accent2">
+                  <a:lumMod val="75000"/>
+                </a:schemeClr>
+              </a:solidFill>
+            </a:endParaRPr>
+          </a:p>
+        </p:txBody>
+      </p:sp>
+      <p:sp>
+        <p:nvSpPr>
+          <p:cNvPr id="3" name="Content Placeholder 2"/>
+          <p:cNvSpPr>
+            <a:spLocks noGrp="1"/>
+          </p:cNvSpPr>
+          <p:nvPr>
+            <p:ph idx="1"/>
+          </p:nvPr>
+        </p:nvSpPr>
+        <p:spPr/>
+        <p:txBody>
+          <a:bodyPr/>
+          <a:lstStyle/>
+          <a:p>
+            <a:r>
+              <a:rPr lang="en-US" dirty="0" smtClean="0"/>
+              <a:t> </a:t>
+            </a:r>
+            <a:r>
+              <a:rPr lang="en-US" sz="3200" dirty="0" smtClean="0"/>
+              <a:t>SEAMS faculty and Mentors</a:t>
+            </a:r>
+          </a:p>
+          <a:p>
+            <a:r>
+              <a:rPr lang="en-US" sz="3200" dirty="0"/>
+              <a:t> </a:t>
+            </a:r>
+            <a:r>
+              <a:rPr lang="en-US" sz="3200" dirty="0" smtClean="0"/>
+              <a:t>SACEMA</a:t>
+            </a:r>
+          </a:p>
+          <a:p>
+            <a:r>
+              <a:rPr lang="en-US" sz="3200" dirty="0"/>
+              <a:t> </a:t>
+            </a:r>
+            <a:r>
+              <a:rPr lang="en-US" sz="3200" dirty="0" smtClean="0"/>
+              <a:t>Fellow participants</a:t>
+            </a:r>
+          </a:p>
+          <a:p>
+            <a:endParaRPr lang="en-US" dirty="0"/>
+          </a:p>
+          <a:p>
+            <a:pPr marL="0" indent="0">
+              <a:buNone/>
+            </a:pPr>
+            <a:endParaRPr lang="en-ZA" dirty="0"/>
+          </a:p>
+        </p:txBody>
+      </p:sp>
+      <p:sp>
+        <p:nvSpPr>
+          <p:cNvPr id="4" name="Rectangle 3"/>
+          <p:cNvSpPr/>
+          <p:nvPr/>
+        </p:nvSpPr>
+        <p:spPr>
+          <a:xfrm>
+            <a:off x="4355523" y="4001294"/>
+            <a:ext cx="3480953" cy="1015663"/>
+          </a:xfrm>
+          <a:prstGeom prst="rect">
+            <a:avLst/>
+          </a:prstGeom>
+          <a:noFill/>
+        </p:spPr>
+        <p:txBody>
+          <a:bodyPr wrap="none" lIns="91440" tIns="45720" rIns="91440" bIns="45720">
+            <a:spAutoFit/>
+          </a:bodyPr>
+          <a:lstStyle/>
+          <a:p>
+            <a:pPr algn="ctr"/>
+            <a:r>
+              <a:rPr lang="en-US" sz="6000" b="1" dirty="0" smtClean="0">
+                <a:ln w="13462">
+                  <a:solidFill>
+                    <a:schemeClr val="bg1"/>
+                  </a:solidFill>
+                  <a:prstDash val="solid"/>
+                </a:ln>
+                <a:solidFill>
+                  <a:schemeClr val="tx1">
+                    <a:lumMod val="85000"/>
+                    <a:lumOff val="15000"/>
+                  </a:schemeClr>
+                </a:solidFill>
+                <a:effectLst>
+                  <a:outerShdw dist="38100" dir="2700000" algn="bl" rotWithShape="0">
+                    <a:schemeClr val="accent5"/>
+                  </a:outerShdw>
+                </a:effectLst>
+              </a:rPr>
+              <a:t>Thank You</a:t>
+            </a:r>
+            <a:endParaRPr lang="en-US" sz="6000" b="1" cap="none" spc="0" dirty="0">
+              <a:ln w="13462">
+                <a:solidFill>
+                  <a:schemeClr val="bg1"/>
+                </a:solidFill>
+                <a:prstDash val="solid"/>
+              </a:ln>
+              <a:solidFill>
+                <a:schemeClr val="tx1">
+                  <a:lumMod val="85000"/>
+                  <a:lumOff val="15000"/>
+                </a:schemeClr>
+              </a:solidFill>
+              <a:effectLst>
+                <a:outerShdw dist="38100" dir="2700000" algn="bl" rotWithShape="0">
+                  <a:schemeClr val="accent5"/>
+                </a:outerShdw>
+              </a:effectLst>
+            </a:endParaRPr>
+          </a:p>
+        </p:txBody>
+      </p:sp>
+    </p:spTree>
+    <p:extLst>
+      <p:ext uri="{BB962C8B-B14F-4D97-AF65-F5344CB8AC3E}">
+        <p14:creationId xmlns:p14="http://schemas.microsoft.com/office/powerpoint/2010/main" val="925596261"/>
+      </p:ext>
+    </p:extLst>
+  </p:cSld>
+  <p:clrMapOvr>
+    <a:masterClrMapping/>
+  </p:clrMapOvr>
+</p:sld>
+</file>
+
 <file path=ppt/slides/slide2.xml><?xml version="1.0" encoding="utf-8"?>
 <p:sld xmlns:a="http://schemas.openxmlformats.org/drawingml/2006/main" xmlns:r="http://schemas.openxmlformats.org/officeDocument/2006/relationships" xmlns:p="http://schemas.openxmlformats.org/presentationml/2006/main">
   <p:cSld>
@@ -3846,7 +4034,7 @@
         </p:nvSpPr>
         <p:spPr>
           <a:xfrm>
-            <a:off x="440575" y="648393"/>
+            <a:off x="465512" y="436099"/>
             <a:ext cx="10922923" cy="881149"/>
           </a:xfrm>
         </p:spPr>
@@ -3864,7 +4052,17 @@
                   </a:schemeClr>
                 </a:solidFill>
               </a:rPr>
-              <a:t>Flow Diagram</a:t>
+              <a:t>Flow </a:t>
+            </a:r>
+            <a:r>
+              <a:rPr lang="en-US" b="1" dirty="0" smtClean="0">
+                <a:solidFill>
+                  <a:schemeClr val="accent2">
+                    <a:lumMod val="75000"/>
+                  </a:schemeClr>
+                </a:solidFill>
+              </a:rPr>
+              <a:t>Diagram &amp; Minimum Goal</a:t>
             </a:r>
             <a:endParaRPr lang="en-ZA" sz="3600" b="1" dirty="0">
               <a:solidFill>
@@ -3888,8 +4086,8 @@
         </p:nvSpPr>
         <p:spPr>
           <a:xfrm>
-            <a:off x="440575" y="1670858"/>
-            <a:ext cx="10922923" cy="4506106"/>
+            <a:off x="207816" y="970511"/>
+            <a:ext cx="11180619" cy="5887489"/>
           </a:xfrm>
         </p:spPr>
         <p:txBody>
@@ -3911,8 +4109,8 @@
           </a:p>
         </p:txBody>
       </p:sp>
-      <mc:AlternateContent xmlns:mc="http://schemas.openxmlformats.org/markup-compatibility/2006" xmlns:a14="http://schemas.microsoft.com/office/drawing/2010/main">
-        <mc:Choice Requires="a14">
+      <mc:AlternateContent xmlns:mc="http://schemas.openxmlformats.org/markup-compatibility/2006">
+        <mc:Choice xmlns:a14="http://schemas.microsoft.com/office/drawing/2010/main" Requires="a14">
           <p:sp>
             <p:nvSpPr>
               <p:cNvPr id="7" name="Flowchart: Process 6"/>
@@ -3921,7 +4119,7 @@
             </p:nvSpPr>
             <p:spPr>
               <a:xfrm>
-                <a:off x="552801" y="2527069"/>
+                <a:off x="598516" y="2103424"/>
                 <a:ext cx="2069874" cy="2211185"/>
               </a:xfrm>
               <a:prstGeom prst="flowChartProcess">
@@ -3965,15 +4163,6 @@
                 </a:r>
                 <a14:m>
                   <m:oMath xmlns:m="http://schemas.openxmlformats.org/officeDocument/2006/math">
-                    <m:r>
-                      <a:rPr lang="en-US" sz="2800" i="1" smtClean="0">
-                        <a:solidFill>
-                          <a:schemeClr val="tx1"/>
-                        </a:solidFill>
-                        <a:latin typeface="Cambria Math" panose="02040503050406030204" pitchFamily="18" charset="0"/>
-                      </a:rPr>
-                      <m:t>≤</m:t>
-                    </m:r>
                     <m:sSup>
                       <m:sSupPr>
                         <m:ctrlPr>
@@ -4016,7 +4205,26 @@
                       <a:schemeClr val="tx1"/>
                     </a:solidFill>
                   </a:rPr>
-                  <a:t> simulations per calibration method</a:t>
+                  <a:t> </a:t>
+                </a:r>
+                <a:r>
+                  <a:rPr lang="en-ZA" sz="2800" dirty="0" smtClean="0">
+                    <a:solidFill>
+                      <a:schemeClr val="tx1"/>
+                    </a:solidFill>
+                  </a:rPr>
+                  <a:t>simulations</a:t>
+                </a:r>
+              </a:p>
+              <a:p>
+                <a:pPr algn="ctr"/>
+                <a:r>
+                  <a:rPr lang="en-US" sz="2800" dirty="0" smtClean="0">
+                    <a:solidFill>
+                      <a:schemeClr val="tx1"/>
+                    </a:solidFill>
+                  </a:rPr>
+                  <a:t>for reference</a:t>
                 </a:r>
                 <a:endParaRPr lang="en-ZA" sz="2800" dirty="0">
                   <a:solidFill>
@@ -4027,7 +4235,7 @@
             </p:txBody>
           </p:sp>
         </mc:Choice>
-        <mc:Fallback xmlns="">
+        <mc:Fallback>
           <p:sp>
             <p:nvSpPr>
               <p:cNvPr id="7" name="Flowchart: Process 6"/>
@@ -4038,7 +4246,7 @@
             </p:nvSpPr>
             <p:spPr>
               <a:xfrm>
-                <a:off x="552801" y="2527069"/>
+                <a:off x="598516" y="2103424"/>
                 <a:ext cx="2069874" cy="2211185"/>
               </a:xfrm>
               <a:prstGeom prst="flowChartProcess">
@@ -4047,7 +4255,7 @@
               <a:blipFill>
                 <a:blip r:embed="rId2"/>
                 <a:stretch>
-                  <a:fillRect t="-2747" r="-4399" b="-7967"/>
+                  <a:fillRect l="-5263" r="-4971"/>
                 </a:stretch>
               </a:blipFill>
             </p:spPr>
@@ -4074,8 +4282,8 @@
         </p:nvSpPr>
         <p:spPr>
           <a:xfrm>
-            <a:off x="2622675" y="3229495"/>
-            <a:ext cx="881144" cy="484632"/>
+            <a:off x="2687499" y="2763982"/>
+            <a:ext cx="797200" cy="484632"/>
           </a:xfrm>
           <a:prstGeom prst="rightArrow">
             <a:avLst/>
@@ -4112,64 +4320,163 @@
           </a:p>
         </p:txBody>
       </p:sp>
-      <p:sp>
-        <p:nvSpPr>
-          <p:cNvPr id="9" name="Flowchart: Process 8"/>
-          <p:cNvSpPr/>
-          <p:nvPr/>
-        </p:nvSpPr>
-        <p:spPr>
-          <a:xfrm>
-            <a:off x="3449782" y="2527070"/>
-            <a:ext cx="2161313" cy="2211184"/>
-          </a:xfrm>
-          <a:prstGeom prst="flowChartProcess">
-            <a:avLst/>
-          </a:prstGeom>
-          <a:solidFill>
-            <a:schemeClr val="accent2">
-              <a:lumMod val="60000"/>
-              <a:lumOff val="40000"/>
-            </a:schemeClr>
-          </a:solidFill>
-        </p:spPr>
-        <p:style>
-          <a:lnRef idx="2">
-            <a:schemeClr val="accent2">
-              <a:shade val="50000"/>
-            </a:schemeClr>
-          </a:lnRef>
-          <a:fillRef idx="1">
-            <a:schemeClr val="accent2"/>
-          </a:fillRef>
-          <a:effectRef idx="0">
-            <a:schemeClr val="accent2"/>
-          </a:effectRef>
-          <a:fontRef idx="minor">
-            <a:schemeClr val="lt1"/>
-          </a:fontRef>
-        </p:style>
-        <p:txBody>
-          <a:bodyPr rtlCol="0" anchor="ctr"/>
-          <a:lstStyle/>
-          <a:p>
-            <a:pPr algn="ctr"/>
-            <a:r>
-              <a:rPr lang="en-US" sz="2800" dirty="0" smtClean="0">
-                <a:solidFill>
-                  <a:schemeClr val="tx1"/>
-                </a:solidFill>
-              </a:rPr>
-              <a:t>Retain parameter combinations</a:t>
-            </a:r>
-            <a:endParaRPr lang="en-ZA" sz="2800" dirty="0">
+      <mc:AlternateContent xmlns:mc="http://schemas.openxmlformats.org/markup-compatibility/2006">
+        <mc:Choice xmlns:a14="http://schemas.microsoft.com/office/drawing/2010/main" Requires="a14">
+          <p:sp>
+            <p:nvSpPr>
+              <p:cNvPr id="9" name="Flowchart: Process 8"/>
+              <p:cNvSpPr/>
+              <p:nvPr/>
+            </p:nvSpPr>
+            <p:spPr>
+              <a:xfrm>
+                <a:off x="3503809" y="2103424"/>
+                <a:ext cx="2161313" cy="2211184"/>
+              </a:xfrm>
+              <a:prstGeom prst="flowChartProcess">
+                <a:avLst/>
+              </a:prstGeom>
               <a:solidFill>
-                <a:schemeClr val="tx1"/>
+                <a:schemeClr val="accent2">
+                  <a:lumMod val="60000"/>
+                  <a:lumOff val="40000"/>
+                </a:schemeClr>
               </a:solidFill>
-            </a:endParaRPr>
-          </a:p>
-        </p:txBody>
-      </p:sp>
+            </p:spPr>
+            <p:style>
+              <a:lnRef idx="2">
+                <a:schemeClr val="accent2">
+                  <a:shade val="50000"/>
+                </a:schemeClr>
+              </a:lnRef>
+              <a:fillRef idx="1">
+                <a:schemeClr val="accent2"/>
+              </a:fillRef>
+              <a:effectRef idx="0">
+                <a:schemeClr val="accent2"/>
+              </a:effectRef>
+              <a:fontRef idx="minor">
+                <a:schemeClr val="lt1"/>
+              </a:fontRef>
+            </p:style>
+            <p:txBody>
+              <a:bodyPr rtlCol="0" anchor="ctr"/>
+              <a:lstStyle/>
+              <a:p>
+                <a:pPr algn="ctr"/>
+                <a:r>
+                  <a:rPr lang="en-US" sz="2800" dirty="0">
+                    <a:solidFill>
+                      <a:schemeClr val="tx1"/>
+                    </a:solidFill>
+                  </a:rPr>
+                  <a:t>Retain </a:t>
+                </a:r>
+                <a14:m>
+                  <m:oMath xmlns:m="http://schemas.openxmlformats.org/officeDocument/2006/math">
+                    <m:sSup>
+                      <m:sSupPr>
+                        <m:ctrlPr>
+                          <a:rPr lang="en-US" sz="2800" i="1">
+                            <a:solidFill>
+                              <a:schemeClr val="tx1"/>
+                            </a:solidFill>
+                            <a:latin typeface="Cambria Math" panose="02040503050406030204" pitchFamily="18" charset="0"/>
+                          </a:rPr>
+                        </m:ctrlPr>
+                      </m:sSupPr>
+                      <m:e>
+                        <m:r>
+                          <a:rPr lang="en-US" sz="2800" i="1">
+                            <a:solidFill>
+                              <a:schemeClr val="tx1"/>
+                            </a:solidFill>
+                            <a:latin typeface="Cambria Math" panose="02040503050406030204" pitchFamily="18" charset="0"/>
+                          </a:rPr>
+                          <m:t>10</m:t>
+                        </m:r>
+                      </m:e>
+                      <m:sup>
+                        <m:r>
+                          <a:rPr lang="en-US" sz="2800" i="1">
+                            <a:solidFill>
+                              <a:schemeClr val="tx1"/>
+                            </a:solidFill>
+                            <a:latin typeface="Cambria Math" panose="02040503050406030204" pitchFamily="18" charset="0"/>
+                          </a:rPr>
+                          <m:t>6</m:t>
+                        </m:r>
+                      </m:sup>
+                    </m:sSup>
+                  </m:oMath>
+                </a14:m>
+                <a:r>
+                  <a:rPr lang="en-US" sz="2800" dirty="0">
+                    <a:solidFill>
+                      <a:schemeClr val="tx1"/>
+                    </a:solidFill>
+                  </a:rPr>
+                  <a:t> parameter combinations</a:t>
+                </a:r>
+              </a:p>
+              <a:p>
+                <a:pPr algn="ctr"/>
+                <a:r>
+                  <a:rPr lang="en-US" sz="2800" dirty="0">
+                    <a:solidFill>
+                      <a:schemeClr val="tx1"/>
+                    </a:solidFill>
+                  </a:rPr>
+                  <a:t>(posterior)</a:t>
+                </a:r>
+                <a:endParaRPr lang="en-ZA" sz="2800" dirty="0">
+                  <a:solidFill>
+                    <a:schemeClr val="tx1"/>
+                  </a:solidFill>
+                </a:endParaRPr>
+              </a:p>
+            </p:txBody>
+          </p:sp>
+        </mc:Choice>
+        <mc:Fallback>
+          <p:sp>
+            <p:nvSpPr>
+              <p:cNvPr id="9" name="Flowchart: Process 8"/>
+              <p:cNvSpPr>
+                <a:spLocks noRot="1" noChangeAspect="1" noMove="1" noResize="1" noEditPoints="1" noAdjustHandles="1" noChangeArrowheads="1" noChangeShapeType="1" noTextEdit="1"/>
+              </p:cNvSpPr>
+              <p:nvPr/>
+            </p:nvSpPr>
+            <p:spPr>
+              <a:xfrm>
+                <a:off x="3503809" y="2103424"/>
+                <a:ext cx="2161313" cy="2211184"/>
+              </a:xfrm>
+              <a:prstGeom prst="flowChartProcess">
+                <a:avLst/>
+              </a:prstGeom>
+              <a:blipFill>
+                <a:blip r:embed="rId3"/>
+                <a:stretch>
+                  <a:fillRect l="-4775" r="-4494"/>
+                </a:stretch>
+              </a:blipFill>
+            </p:spPr>
+            <p:txBody>
+              <a:bodyPr/>
+              <a:lstStyle/>
+              <a:p>
+                <a:r>
+                  <a:rPr lang="en-ZA">
+                    <a:noFill/>
+                  </a:rPr>
+                  <a:t> </a:t>
+                </a:r>
+              </a:p>
+            </p:txBody>
+          </p:sp>
+        </mc:Fallback>
+      </mc:AlternateContent>
       <p:sp>
         <p:nvSpPr>
           <p:cNvPr id="10" name="Right Arrow 9"/>
@@ -4178,8 +4485,8 @@
         </p:nvSpPr>
         <p:spPr>
           <a:xfrm>
-            <a:off x="5611093" y="3229495"/>
-            <a:ext cx="978408" cy="484632"/>
+            <a:off x="5678835" y="2752760"/>
+            <a:ext cx="820468" cy="484632"/>
           </a:xfrm>
           <a:prstGeom prst="rightArrow">
             <a:avLst/>
@@ -4224,7 +4531,7 @@
         </p:nvSpPr>
         <p:spPr>
           <a:xfrm>
-            <a:off x="9368444" y="2527070"/>
+            <a:off x="6505529" y="2061557"/>
             <a:ext cx="1995054" cy="2211184"/>
           </a:xfrm>
           <a:prstGeom prst="flowChartProcess">
@@ -4259,12 +4566,12 @@
           <a:p>
             <a:pPr algn="ctr"/>
             <a:r>
-              <a:rPr lang="en-US" sz="2800" dirty="0" smtClean="0">
+              <a:rPr lang="en-US" sz="2800" dirty="0">
                 <a:solidFill>
                   <a:schemeClr val="tx1"/>
                 </a:solidFill>
               </a:rPr>
-              <a:t>Save outputs for comparison</a:t>
+              <a:t>Save posterior for comparison</a:t>
             </a:r>
             <a:endParaRPr lang="en-ZA" sz="2800" dirty="0">
               <a:solidFill>
@@ -4282,8 +4589,8 @@
         </p:nvSpPr>
         <p:spPr>
           <a:xfrm>
-            <a:off x="8487296" y="3229495"/>
-            <a:ext cx="881148" cy="484632"/>
+            <a:off x="8493095" y="2769386"/>
+            <a:ext cx="819206" cy="484632"/>
           </a:xfrm>
           <a:prstGeom prst="rightArrow">
             <a:avLst/>
@@ -4320,38 +4627,178 @@
           </a:p>
         </p:txBody>
       </p:sp>
-      <p:sp>
-        <p:nvSpPr>
-          <p:cNvPr id="13" name="Flowchart: Process 12"/>
+      <mc:AlternateContent xmlns:mc="http://schemas.openxmlformats.org/markup-compatibility/2006">
+        <mc:Choice xmlns:a14="http://schemas.microsoft.com/office/drawing/2010/main" Requires="a14">
+          <p:sp>
+            <p:nvSpPr>
+              <p:cNvPr id="14" name="Flowchart: Process 13"/>
+              <p:cNvSpPr/>
+              <p:nvPr/>
+            </p:nvSpPr>
+            <p:spPr>
+              <a:xfrm>
+                <a:off x="9340990" y="2061557"/>
+                <a:ext cx="1897795" cy="2211184"/>
+              </a:xfrm>
+              <a:prstGeom prst="flowChartProcess">
+                <a:avLst/>
+              </a:prstGeom>
+              <a:solidFill>
+                <a:schemeClr val="accent2">
+                  <a:lumMod val="60000"/>
+                  <a:lumOff val="40000"/>
+                </a:schemeClr>
+              </a:solidFill>
+            </p:spPr>
+            <p:style>
+              <a:lnRef idx="2">
+                <a:schemeClr val="accent2">
+                  <a:shade val="50000"/>
+                </a:schemeClr>
+              </a:lnRef>
+              <a:fillRef idx="1">
+                <a:schemeClr val="accent2"/>
+              </a:fillRef>
+              <a:effectRef idx="0">
+                <a:schemeClr val="accent2"/>
+              </a:effectRef>
+              <a:fontRef idx="minor">
+                <a:schemeClr val="lt1"/>
+              </a:fontRef>
+            </p:style>
+            <p:txBody>
+              <a:bodyPr rtlCol="0" anchor="ctr"/>
+              <a:lstStyle/>
+              <a:p>
+                <a:pPr algn="ctr"/>
+                <a:r>
+                  <a:rPr lang="en-US" sz="2800" dirty="0" smtClean="0">
+                    <a:solidFill>
+                      <a:schemeClr val="tx1"/>
+                    </a:solidFill>
+                  </a:rPr>
+                  <a:t>Run </a:t>
+                </a:r>
+                <a14:m>
+                  <m:oMath xmlns:m="http://schemas.openxmlformats.org/officeDocument/2006/math">
+                    <m:sSup>
+                      <m:sSupPr>
+                        <m:ctrlPr>
+                          <a:rPr lang="en-US" sz="2800" i="1">
+                            <a:solidFill>
+                              <a:schemeClr val="tx1"/>
+                            </a:solidFill>
+                            <a:latin typeface="Cambria Math" panose="02040503050406030204" pitchFamily="18" charset="0"/>
+                          </a:rPr>
+                        </m:ctrlPr>
+                      </m:sSupPr>
+                      <m:e>
+                        <m:r>
+                          <a:rPr lang="en-US" sz="2800" i="1">
+                            <a:solidFill>
+                              <a:schemeClr val="tx1"/>
+                            </a:solidFill>
+                            <a:latin typeface="Cambria Math" panose="02040503050406030204" pitchFamily="18" charset="0"/>
+                          </a:rPr>
+                          <m:t>10</m:t>
+                        </m:r>
+                      </m:e>
+                      <m:sup>
+                        <m:r>
+                          <a:rPr lang="en-US" sz="2800" b="0" i="1" smtClean="0">
+                            <a:solidFill>
+                              <a:schemeClr val="tx1"/>
+                            </a:solidFill>
+                            <a:latin typeface="Cambria Math" panose="02040503050406030204" pitchFamily="18" charset="0"/>
+                          </a:rPr>
+                          <m:t>4</m:t>
+                        </m:r>
+                      </m:sup>
+                    </m:sSup>
+                  </m:oMath>
+                </a14:m>
+                <a:r>
+                  <a:rPr lang="en-US" sz="2800" dirty="0" smtClean="0">
+                    <a:solidFill>
+                      <a:schemeClr val="tx1"/>
+                    </a:solidFill>
+                  </a:rPr>
+                  <a:t> simulations for each calibration method</a:t>
+                </a:r>
+                <a:endParaRPr lang="en-ZA" sz="2800" dirty="0">
+                  <a:solidFill>
+                    <a:schemeClr val="tx1"/>
+                  </a:solidFill>
+                </a:endParaRPr>
+              </a:p>
+            </p:txBody>
+          </p:sp>
+        </mc:Choice>
+        <mc:Fallback>
+          <p:sp>
+            <p:nvSpPr>
+              <p:cNvPr id="14" name="Flowchart: Process 13"/>
+              <p:cNvSpPr>
+                <a:spLocks noRot="1" noChangeAspect="1" noMove="1" noResize="1" noEditPoints="1" noAdjustHandles="1" noChangeArrowheads="1" noChangeShapeType="1" noTextEdit="1"/>
+              </p:cNvSpPr>
+              <p:nvPr/>
+            </p:nvSpPr>
+            <p:spPr>
+              <a:xfrm>
+                <a:off x="9340990" y="2061557"/>
+                <a:ext cx="1897795" cy="2211184"/>
+              </a:xfrm>
+              <a:prstGeom prst="flowChartProcess">
+                <a:avLst/>
+              </a:prstGeom>
+              <a:blipFill>
+                <a:blip r:embed="rId4"/>
+                <a:stretch>
+                  <a:fillRect l="-4140" t="-2466" r="-9236" b="-7945"/>
+                </a:stretch>
+              </a:blipFill>
+            </p:spPr>
+            <p:txBody>
+              <a:bodyPr/>
+              <a:lstStyle/>
+              <a:p>
+                <a:r>
+                  <a:rPr lang="en-ZA">
+                    <a:noFill/>
+                  </a:rPr>
+                  <a:t> </a:t>
+                </a:r>
+              </a:p>
+            </p:txBody>
+          </p:sp>
+        </mc:Fallback>
+      </mc:AlternateContent>
+      <p:sp>
+        <p:nvSpPr>
+          <p:cNvPr id="6" name="Cloud 5"/>
           <p:cNvSpPr/>
           <p:nvPr/>
         </p:nvSpPr>
         <p:spPr>
           <a:xfrm>
-            <a:off x="6589501" y="2527070"/>
-            <a:ext cx="1897795" cy="2211184"/>
+            <a:off x="4807766" y="4839669"/>
+            <a:ext cx="1742137" cy="1243376"/>
           </a:xfrm>
-          <a:prstGeom prst="flowChartProcess">
+          <a:prstGeom prst="cloud">
             <a:avLst/>
           </a:prstGeom>
-          <a:solidFill>
-            <a:schemeClr val="accent2">
-              <a:lumMod val="60000"/>
-              <a:lumOff val="40000"/>
-            </a:schemeClr>
-          </a:solidFill>
         </p:spPr>
         <p:style>
           <a:lnRef idx="2">
-            <a:schemeClr val="accent2">
+            <a:schemeClr val="accent1">
               <a:shade val="50000"/>
             </a:schemeClr>
           </a:lnRef>
           <a:fillRef idx="1">
-            <a:schemeClr val="accent2"/>
+            <a:schemeClr val="accent1"/>
           </a:fillRef>
           <a:effectRef idx="0">
-            <a:schemeClr val="accent2"/>
+            <a:schemeClr val="accent1"/>
           </a:effectRef>
           <a:fontRef idx="minor">
             <a:schemeClr val="lt1"/>
@@ -4363,29 +4810,87 @@
           <a:p>
             <a:pPr algn="ctr"/>
             <a:r>
-              <a:rPr lang="en-US" sz="2800" dirty="0" smtClean="0">
-                <a:solidFill>
-                  <a:schemeClr val="tx1"/>
-                </a:solidFill>
-              </a:rPr>
-              <a:t>Plot posterior for each </a:t>
-            </a:r>
-            <a:r>
-              <a:rPr lang="en-US" sz="2800" dirty="0" err="1" smtClean="0">
-                <a:solidFill>
-                  <a:schemeClr val="tx1"/>
-                </a:solidFill>
-              </a:rPr>
-              <a:t>calibrationmethod</a:t>
-            </a:r>
-            <a:endParaRPr lang="en-ZA" sz="2800" dirty="0">
-              <a:solidFill>
-                <a:schemeClr val="tx1"/>
-              </a:solidFill>
-            </a:endParaRPr>
-          </a:p>
-        </p:txBody>
-      </p:sp>
+              <a:rPr lang="en-US" dirty="0" smtClean="0"/>
+              <a:t>Minimum goal</a:t>
+            </a:r>
+            <a:endParaRPr lang="en-ZA" dirty="0"/>
+          </a:p>
+        </p:txBody>
+      </p:sp>
+      <p:cxnSp>
+        <p:nvCxnSpPr>
+          <p:cNvPr id="17" name="Curved Connector 16"/>
+          <p:cNvCxnSpPr>
+            <a:stCxn id="11" idx="2"/>
+          </p:cNvCxnSpPr>
+          <p:nvPr/>
+        </p:nvCxnSpPr>
+        <p:spPr>
+          <a:xfrm rot="5400000">
+            <a:off x="6611263" y="4125256"/>
+            <a:ext cx="744309" cy="1039278"/>
+          </a:xfrm>
+          <a:prstGeom prst="curvedConnector2">
+            <a:avLst/>
+          </a:prstGeom>
+          <a:ln>
+            <a:solidFill>
+              <a:srgbClr val="C00000"/>
+            </a:solidFill>
+            <a:tailEnd type="triangle"/>
+          </a:ln>
+        </p:spPr>
+        <p:style>
+          <a:lnRef idx="1">
+            <a:schemeClr val="accent1"/>
+          </a:lnRef>
+          <a:fillRef idx="0">
+            <a:schemeClr val="accent1"/>
+          </a:fillRef>
+          <a:effectRef idx="0">
+            <a:schemeClr val="accent1"/>
+          </a:effectRef>
+          <a:fontRef idx="minor">
+            <a:schemeClr val="tx1"/>
+          </a:fontRef>
+        </p:style>
+      </p:cxnSp>
+      <p:cxnSp>
+        <p:nvCxnSpPr>
+          <p:cNvPr id="21" name="Curved Connector 20"/>
+          <p:cNvCxnSpPr/>
+          <p:nvPr/>
+        </p:nvCxnSpPr>
+        <p:spPr>
+          <a:xfrm rot="5400000">
+            <a:off x="6747371" y="4167124"/>
+            <a:ext cx="744309" cy="1039278"/>
+          </a:xfrm>
+          <a:prstGeom prst="curvedConnector2">
+            <a:avLst/>
+          </a:prstGeom>
+          <a:ln>
+            <a:solidFill>
+              <a:srgbClr val="C00000"/>
+            </a:solidFill>
+            <a:tailEnd type="triangle"/>
+          </a:ln>
+        </p:spPr>
+        <p:style>
+          <a:lnRef idx="1">
+            <a:schemeClr val="accent1"/>
+          </a:lnRef>
+          <a:fillRef idx="0">
+            <a:schemeClr val="accent1"/>
+          </a:fillRef>
+          <a:effectRef idx="0">
+            <a:schemeClr val="accent1"/>
+          </a:effectRef>
+          <a:fontRef idx="minor">
+            <a:schemeClr val="tx1"/>
+          </a:fontRef>
+        </p:style>
+      </p:cxnSp>
     </p:spTree>
     <p:extLst>
       <p:ext uri="{BB962C8B-B14F-4D97-AF65-F5344CB8AC3E}">
@@ -4396,6 +4901,13 @@
   <p:clrMapOvr>
     <a:masterClrMapping/>
   </p:clrMapOvr>
+  <p:timing>
+    <p:tnLst>
+      <p:par>
+        <p:cTn id="1" dur="indefinite" restart="never" nodeType="tmRoot"/>
+      </p:par>
+    </p:tnLst>
+  </p:timing>
 </p:sld>
 </file>
 
@@ -4451,8 +4963,8 @@
           </a:p>
         </p:txBody>
       </p:sp>
-      <mc:AlternateContent xmlns:mc="http://schemas.openxmlformats.org/markup-compatibility/2006" xmlns:a14="http://schemas.microsoft.com/office/drawing/2010/main">
-        <mc:Choice Requires="a14">
+      <mc:AlternateContent xmlns:mc="http://schemas.openxmlformats.org/markup-compatibility/2006">
+        <mc:Choice xmlns:a14="http://schemas.microsoft.com/office/drawing/2010/main" Requires="a14">
           <p:sp>
             <p:nvSpPr>
               <p:cNvPr id="3" name="Content Placeholder 2"/>
@@ -4463,7 +4975,12 @@
                 <p:ph idx="1"/>
               </p:nvPr>
             </p:nvSpPr>
-            <p:spPr/>
+            <p:spPr>
+              <a:xfrm>
+                <a:off x="1180407" y="1825625"/>
+                <a:ext cx="7955280" cy="4351338"/>
+              </a:xfrm>
+            </p:spPr>
             <p:txBody>
               <a:bodyPr/>
               <a:lstStyle/>
@@ -4489,15 +5006,23 @@
                 </a:pPr>
                 <a:r>
                   <a:rPr lang="en-US" dirty="0" smtClean="0"/>
-                  <a:t> Made </a:t>
-                </a:r>
-                <a:r>
-                  <a:rPr lang="en-US" dirty="0"/>
-                  <a:t>necessary corrections </a:t>
-                </a:r>
-                <a:r>
-                  <a:rPr lang="en-US" dirty="0" smtClean="0"/>
-                  <a:t>to README </a:t>
+                  <a:t> </a:t>
+                </a:r>
+                <a:r>
+                  <a:rPr lang="en-US" sz="2800" dirty="0"/>
+                  <a:t> </a:t>
+                </a:r>
+                <a:r>
+                  <a:rPr lang="en-US" sz="2800" dirty="0" smtClean="0"/>
+                  <a:t>Created</a:t>
+                </a:r>
+                <a:r>
+                  <a:rPr lang="en-US" sz="2800" dirty="0" smtClean="0"/>
+                  <a:t> </a:t>
+                </a:r>
+                <a:r>
+                  <a:rPr lang="en-US" sz="2800" dirty="0" smtClean="0"/>
+                  <a:t>README </a:t>
                 </a:r>
               </a:p>
               <a:p>
@@ -4506,23 +5031,23 @@
                   <a:buChar char="ü"/>
                 </a:pPr>
                 <a:r>
-                  <a:rPr lang="en-US" dirty="0"/>
+                  <a:rPr lang="en-US" sz="2800" dirty="0"/>
                   <a:t> </a:t>
                 </a:r>
                 <a:r>
-                  <a:rPr lang="en-US" dirty="0" smtClean="0"/>
-                  <a:t>Removed duplications from my code</a:t>
+                  <a:rPr lang="en-US" sz="2800" dirty="0" smtClean="0"/>
+                  <a:t>Removed </a:t>
+                </a:r>
+                <a:r>
+                  <a:rPr lang="en-US" sz="2800" dirty="0" smtClean="0"/>
+                  <a:t>code duplications </a:t>
                 </a:r>
               </a:p>
               <a:p>
                 <a:pPr lvl="2"/>
                 <a:r>
-                  <a:rPr lang="en-US" dirty="0"/>
-                  <a:t> </a:t>
-                </a:r>
-                <a:r>
                   <a:rPr lang="en-US" dirty="0" smtClean="0"/>
-                  <a:t>Created functions file</a:t>
+                  <a:t> Created functions file</a:t>
                 </a:r>
                 <a:endParaRPr lang="en-US" sz="2000" dirty="0" smtClean="0"/>
               </a:p>
@@ -4532,11 +5057,11 @@
                   <a:buChar char="ü"/>
                 </a:pPr>
                 <a:r>
-                  <a:rPr lang="en-US" dirty="0"/>
+                  <a:rPr lang="en-US" dirty="0" smtClean="0"/>
                   <a:t> </a:t>
                 </a:r>
                 <a:r>
-                  <a:rPr lang="en-US" dirty="0" smtClean="0"/>
+                  <a:rPr lang="en-US" sz="2800" dirty="0" smtClean="0"/>
                   <a:t>Identified which method to parallelize</a:t>
                 </a:r>
               </a:p>
@@ -4546,10 +5071,10 @@
                   <a:buChar char="ü"/>
                 </a:pPr>
                 <a:r>
-                  <a:rPr lang="en-US" dirty="0"/>
+                  <a:rPr lang="en-US" sz="2800" dirty="0"/>
                   <a:t> Figured out which part of code took long</a:t>
                 </a:r>
-                <a:endParaRPr lang="en-US" dirty="0" smtClean="0"/>
+                <a:endParaRPr lang="en-US" sz="2800" dirty="0" smtClean="0"/>
               </a:p>
               <a:p>
                 <a:pPr lvl="1">
@@ -4557,7 +5082,7 @@
                   <a:buChar char="ü"/>
                 </a:pPr>
                 <a:r>
-                  <a:rPr lang="en-US" dirty="0" smtClean="0"/>
+                  <a:rPr lang="en-US" sz="2800" dirty="0" smtClean="0"/>
                   <a:t> Identified parallelizable portions of code</a:t>
                 </a:r>
               </a:p>
@@ -4567,17 +5092,17 @@
                   <a:buChar char="ü"/>
                 </a:pPr>
                 <a:r>
-                  <a:rPr lang="en-US" dirty="0"/>
+                  <a:rPr lang="en-US" sz="2800" dirty="0"/>
                   <a:t> </a:t>
                 </a:r>
                 <a:r>
-                  <a:rPr lang="en-US" dirty="0" smtClean="0"/>
+                  <a:rPr lang="en-US" sz="2800" dirty="0" smtClean="0"/>
                   <a:t>Parallelized </a:t>
                 </a:r>
                 <a14:m>
                   <m:oMath xmlns:m="http://schemas.openxmlformats.org/officeDocument/2006/math">
                     <m:r>
-                      <a:rPr lang="en-US" b="0" i="1" smtClean="0">
+                      <a:rPr lang="en-US" sz="2800" b="0" i="1" smtClean="0">
                         <a:latin typeface="Cambria Math" panose="02040503050406030204" pitchFamily="18" charset="0"/>
                       </a:rPr>
                       <m:t>10</m:t>
@@ -4585,14 +5110,14 @@
                     <m:sSup>
                       <m:sSupPr>
                         <m:ctrlPr>
-                          <a:rPr lang="en-US" i="1" smtClean="0">
+                          <a:rPr lang="en-US" sz="2800" i="1" smtClean="0">
                             <a:latin typeface="Cambria Math" panose="02040503050406030204" pitchFamily="18" charset="0"/>
                           </a:rPr>
                         </m:ctrlPr>
                       </m:sSupPr>
                       <m:e>
                         <m:r>
-                          <a:rPr lang="en-US" b="0" i="1" smtClean="0">
+                          <a:rPr lang="en-US" sz="2800" b="0" i="1" smtClean="0">
                             <a:latin typeface="Cambria Math" panose="02040503050406030204" pitchFamily="18" charset="0"/>
                           </a:rPr>
                           <m:t>𝑒</m:t>
@@ -4600,7 +5125,7 @@
                       </m:e>
                       <m:sup>
                         <m:r>
-                          <a:rPr lang="en-US" b="0" i="1" smtClean="0">
+                          <a:rPr lang="en-US" sz="2800" b="0" i="1" smtClean="0">
                             <a:latin typeface="Cambria Math" panose="02040503050406030204" pitchFamily="18" charset="0"/>
                           </a:rPr>
                           <m:t>6</m:t>
@@ -4610,19 +5135,16 @@
                   </m:oMath>
                 </a14:m>
                 <a:r>
-                  <a:rPr lang="en-ZA" dirty="0" smtClean="0"/>
-                  <a:t> simulations in R</a:t>
-                </a:r>
+                  <a:rPr lang="en-ZA" sz="2800" dirty="0" smtClean="0"/>
+                  <a:t> simulations </a:t>
+                </a:r>
+                <a:endParaRPr lang="en-ZA" sz="2800" dirty="0" smtClean="0"/>
               </a:p>
               <a:p>
                 <a:pPr lvl="2"/>
                 <a:r>
-                  <a:rPr lang="en-US" dirty="0"/>
-                  <a:t> </a:t>
-                </a:r>
-                <a:r>
                   <a:rPr lang="en-US" dirty="0" smtClean="0"/>
-                  <a:t>Used “</a:t>
+                  <a:t> Used “</a:t>
                 </a:r>
                 <a:r>
                   <a:rPr lang="en-US" dirty="0" err="1" smtClean="0"/>
@@ -4638,7 +5160,7 @@
                 </a:r>
                 <a:r>
                   <a:rPr lang="en-US" dirty="0" smtClean="0"/>
-                  <a:t>” packages</a:t>
+                  <a:t>” packages in R</a:t>
                 </a:r>
                 <a:endParaRPr lang="en-ZA" dirty="0" smtClean="0"/>
               </a:p>
@@ -4652,7 +5174,7 @@
             </p:txBody>
           </p:sp>
         </mc:Choice>
-        <mc:Fallback xmlns="">
+        <mc:Fallback>
           <p:sp>
             <p:nvSpPr>
               <p:cNvPr id="3" name="Content Placeholder 2"/>
@@ -4664,10 +5186,14 @@
               </p:nvPr>
             </p:nvSpPr>
             <p:spPr>
+              <a:xfrm>
+                <a:off x="1180407" y="1825625"/>
+                <a:ext cx="7955280" cy="4351338"/>
+              </a:xfrm>
               <a:blipFill>
                 <a:blip r:embed="rId2"/>
                 <a:stretch>
-                  <a:fillRect l="-1217" t="-2241"/>
+                  <a:fillRect l="-1609" t="-2241"/>
                 </a:stretch>
               </a:blipFill>
             </p:spPr>
@@ -4696,149 +5222,17 @@
   <p:clrMapOvr>
     <a:masterClrMapping/>
   </p:clrMapOvr>
+  <p:timing>
+    <p:tnLst>
+      <p:par>
+        <p:cTn id="1" dur="indefinite" restart="never" nodeType="tmRoot"/>
+      </p:par>
+    </p:tnLst>
+  </p:timing>
 </p:sld>
 </file>
 
 <file path=ppt/slides/slide5.xml><?xml version="1.0" encoding="utf-8"?>
-<p:sld xmlns:a="http://schemas.openxmlformats.org/drawingml/2006/main" xmlns:r="http://schemas.openxmlformats.org/officeDocument/2006/relationships" xmlns:p="http://schemas.openxmlformats.org/presentationml/2006/main">
-  <p:cSld>
-    <p:spTree>
-      <p:nvGrpSpPr>
-        <p:cNvPr id="1" name=""/>
-        <p:cNvGrpSpPr/>
-        <p:nvPr/>
-      </p:nvGrpSpPr>
-      <p:grpSpPr>
-        <a:xfrm>
-          <a:off x="0" y="0"/>
-          <a:ext cx="0" cy="0"/>
-          <a:chOff x="0" y="0"/>
-          <a:chExt cx="0" cy="0"/>
-        </a:xfrm>
-      </p:grpSpPr>
-      <p:sp>
-        <p:nvSpPr>
-          <p:cNvPr id="2" name="Title 1"/>
-          <p:cNvSpPr>
-            <a:spLocks noGrp="1"/>
-          </p:cNvSpPr>
-          <p:nvPr>
-            <p:ph type="title"/>
-          </p:nvPr>
-        </p:nvSpPr>
-        <p:spPr>
-          <a:xfrm>
-            <a:off x="845127" y="120852"/>
-            <a:ext cx="10515600" cy="1325563"/>
-          </a:xfrm>
-        </p:spPr>
-        <p:txBody>
-          <a:bodyPr/>
-          <a:lstStyle/>
-          <a:p>
-            <a:r>
-              <a:rPr lang="en-US" b="1" dirty="0" smtClean="0">
-                <a:solidFill>
-                  <a:schemeClr val="accent2">
-                    <a:lumMod val="75000"/>
-                  </a:schemeClr>
-                </a:solidFill>
-              </a:rPr>
-              <a:t>Parallel </a:t>
-            </a:r>
-            <a:r>
-              <a:rPr lang="en-US" b="1" dirty="0">
-                <a:solidFill>
-                  <a:schemeClr val="accent2">
-                    <a:lumMod val="75000"/>
-                  </a:schemeClr>
-                </a:solidFill>
-              </a:rPr>
-              <a:t>C</a:t>
-            </a:r>
-            <a:r>
-              <a:rPr lang="en-US" b="1" dirty="0" smtClean="0">
-                <a:solidFill>
-                  <a:schemeClr val="accent2">
-                    <a:lumMod val="75000"/>
-                  </a:schemeClr>
-                </a:solidFill>
-              </a:rPr>
-              <a:t>ode </a:t>
-            </a:r>
-            <a:r>
-              <a:rPr lang="en-US" b="1" dirty="0">
-                <a:solidFill>
-                  <a:schemeClr val="accent2">
-                    <a:lumMod val="75000"/>
-                  </a:schemeClr>
-                </a:solidFill>
-              </a:rPr>
-              <a:t>U</a:t>
-            </a:r>
-            <a:r>
-              <a:rPr lang="en-US" b="1" dirty="0" smtClean="0">
-                <a:solidFill>
-                  <a:schemeClr val="accent2">
-                    <a:lumMod val="75000"/>
-                  </a:schemeClr>
-                </a:solidFill>
-              </a:rPr>
-              <a:t>sed</a:t>
-            </a:r>
-            <a:endParaRPr lang="en-ZA" b="1" dirty="0">
-              <a:solidFill>
-                <a:schemeClr val="accent2">
-                  <a:lumMod val="75000"/>
-                </a:schemeClr>
-              </a:solidFill>
-            </a:endParaRPr>
-          </a:p>
-        </p:txBody>
-      </p:sp>
-      <p:pic>
-        <p:nvPicPr>
-          <p:cNvPr id="4" name="Content Placeholder 3"/>
-          <p:cNvPicPr>
-            <a:picLocks noGrp="1" noChangeAspect="1"/>
-          </p:cNvPicPr>
-          <p:nvPr>
-            <p:ph idx="1"/>
-          </p:nvPr>
-        </p:nvPicPr>
-        <p:blipFill>
-          <a:blip r:embed="rId2">
-            <a:extLst>
-              <a:ext uri="{28A0092B-C50C-407E-A947-70E740481C1C}">
-                <a14:useLocalDpi xmlns:a14="http://schemas.microsoft.com/office/drawing/2010/main" val="0"/>
-              </a:ext>
-            </a:extLst>
-          </a:blip>
-          <a:stretch>
-            <a:fillRect/>
-          </a:stretch>
-        </p:blipFill>
-        <p:spPr>
-          <a:xfrm>
-            <a:off x="2050210" y="1551305"/>
-            <a:ext cx="8105433" cy="4351338"/>
-          </a:xfrm>
-        </p:spPr>
-      </p:pic>
-    </p:spTree>
-    <p:extLst>
-      <p:ext uri="{BB962C8B-B14F-4D97-AF65-F5344CB8AC3E}">
-        <p14:creationId xmlns:p14="http://schemas.microsoft.com/office/powerpoint/2010/main" val="1687896869"/>
-      </p:ext>
-    </p:extLst>
-  </p:cSld>
-  <p:clrMapOvr>
-    <a:masterClrMapping/>
-  </p:clrMapOvr>
-</p:sld>
-</file>
-
-<file path=ppt/slides/slide6.xml><?xml version="1.0" encoding="utf-8"?>
 <p:sld xmlns:a="http://schemas.openxmlformats.org/drawingml/2006/main" xmlns:r="http://schemas.openxmlformats.org/officeDocument/2006/relationships" xmlns:p="http://schemas.openxmlformats.org/presentationml/2006/main">
   <p:cSld>
     <p:spTree>
@@ -5952,7 +6346,7 @@
         <p:spPr>
           <a:xfrm>
             <a:off x="2144685" y="2169856"/>
-            <a:ext cx="7223324" cy="369332"/>
+            <a:ext cx="6833794" cy="369332"/>
           </a:xfrm>
           <a:prstGeom prst="rect">
             <a:avLst/>
@@ -5967,7 +6361,15 @@
           <a:p>
             <a:r>
               <a:rPr lang="en-US" dirty="0" smtClean="0"/>
-              <a:t>Table 1: Runtimes times for running Rejection ABC in sequence and parallel</a:t>
+              <a:t>Table 1: </a:t>
+            </a:r>
+            <a:r>
+              <a:rPr lang="en-US" dirty="0" smtClean="0"/>
+              <a:t>Runtimes </a:t>
+            </a:r>
+            <a:r>
+              <a:rPr lang="en-US" dirty="0" smtClean="0"/>
+              <a:t>for running Rejection ABC in sequence and parallel</a:t>
             </a:r>
             <a:endParaRPr lang="en-ZA" dirty="0"/>
           </a:p>
@@ -5977,6 +6379,314 @@
     <p:extLst>
       <p:ext uri="{BB962C8B-B14F-4D97-AF65-F5344CB8AC3E}">
         <p14:creationId xmlns:p14="http://schemas.microsoft.com/office/powerpoint/2010/main" val="2240472375"/>
+      </p:ext>
+    </p:extLst>
+  </p:cSld>
+  <p:clrMapOvr>
+    <a:masterClrMapping/>
+  </p:clrMapOvr>
+  <p:timing>
+    <p:tnLst>
+      <p:par>
+        <p:cTn id="1" dur="indefinite" restart="never" nodeType="tmRoot"/>
+      </p:par>
+    </p:tnLst>
+  </p:timing>
+</p:sld>
+</file>
+
+<file path=ppt/slides/slide6.xml><?xml version="1.0" encoding="utf-8"?>
+<p:sld xmlns:a="http://schemas.openxmlformats.org/drawingml/2006/main" xmlns:r="http://schemas.openxmlformats.org/officeDocument/2006/relationships" xmlns:p="http://schemas.openxmlformats.org/presentationml/2006/main">
+  <p:cSld>
+    <p:spTree>
+      <p:nvGrpSpPr>
+        <p:cNvPr id="1" name=""/>
+        <p:cNvGrpSpPr/>
+        <p:nvPr/>
+      </p:nvGrpSpPr>
+      <p:grpSpPr>
+        <a:xfrm>
+          <a:off x="0" y="0"/>
+          <a:ext cx="0" cy="0"/>
+          <a:chOff x="0" y="0"/>
+          <a:chExt cx="0" cy="0"/>
+        </a:xfrm>
+      </p:grpSpPr>
+      <p:sp>
+        <p:nvSpPr>
+          <p:cNvPr id="2" name="Title 1"/>
+          <p:cNvSpPr>
+            <a:spLocks noGrp="1"/>
+          </p:cNvSpPr>
+          <p:nvPr>
+            <p:ph type="title"/>
+          </p:nvPr>
+        </p:nvSpPr>
+        <p:spPr>
+          <a:xfrm>
+            <a:off x="773082" y="623456"/>
+            <a:ext cx="10582306" cy="1072342"/>
+          </a:xfrm>
+        </p:spPr>
+        <p:txBody>
+          <a:bodyPr>
+            <a:normAutofit fontScale="90000"/>
+          </a:bodyPr>
+          <a:lstStyle/>
+          <a:p>
+            <a:r>
+              <a:rPr lang="en-US" b="1" dirty="0" smtClean="0">
+                <a:solidFill>
+                  <a:schemeClr val="accent2">
+                    <a:lumMod val="75000"/>
+                  </a:schemeClr>
+                </a:solidFill>
+              </a:rPr>
+              <a:t/>
+            </a:r>
+            <a:br>
+              <a:rPr lang="en-US" b="1" dirty="0" smtClean="0">
+                <a:solidFill>
+                  <a:schemeClr val="accent2">
+                    <a:lumMod val="75000"/>
+                  </a:schemeClr>
+                </a:solidFill>
+              </a:rPr>
+            </a:br>
+            <a:r>
+              <a:rPr lang="en-US" sz="4900" b="1" dirty="0" smtClean="0">
+                <a:solidFill>
+                  <a:schemeClr val="accent2">
+                    <a:lumMod val="75000"/>
+                  </a:schemeClr>
+                </a:solidFill>
+              </a:rPr>
+              <a:t>Was </a:t>
+            </a:r>
+            <a:r>
+              <a:rPr lang="en-US" sz="4900" b="1" dirty="0">
+                <a:solidFill>
+                  <a:schemeClr val="accent2">
+                    <a:lumMod val="75000"/>
+                  </a:schemeClr>
+                </a:solidFill>
+              </a:rPr>
+              <a:t>Parallelizing useful?</a:t>
+            </a:r>
+            <a:r>
+              <a:rPr lang="en-US" dirty="0"/>
+              <a:t> </a:t>
+            </a:r>
+            <a:br>
+              <a:rPr lang="en-US" dirty="0"/>
+            </a:br>
+            <a:endParaRPr lang="en-ZA" b="1" dirty="0">
+              <a:solidFill>
+                <a:schemeClr val="accent2">
+                  <a:lumMod val="75000"/>
+                </a:schemeClr>
+              </a:solidFill>
+            </a:endParaRPr>
+          </a:p>
+        </p:txBody>
+      </p:sp>
+      <mc:AlternateContent xmlns:mc="http://schemas.openxmlformats.org/markup-compatibility/2006">
+        <mc:Choice xmlns:a14="http://schemas.microsoft.com/office/drawing/2010/main" Requires="a14">
+          <p:sp>
+            <p:nvSpPr>
+              <p:cNvPr id="7" name="Content Placeholder 6"/>
+              <p:cNvSpPr>
+                <a:spLocks noGrp="1"/>
+              </p:cNvSpPr>
+              <p:nvPr>
+                <p:ph sz="quarter" idx="4"/>
+              </p:nvPr>
+            </p:nvSpPr>
+            <p:spPr>
+              <a:xfrm>
+                <a:off x="1064030" y="1795549"/>
+                <a:ext cx="7855526" cy="4394114"/>
+              </a:xfrm>
+            </p:spPr>
+            <p:txBody>
+              <a:bodyPr>
+                <a:normAutofit/>
+              </a:bodyPr>
+              <a:lstStyle/>
+              <a:p>
+                <a:r>
+                  <a:rPr lang="en-US" dirty="0" smtClean="0"/>
+                  <a:t>Very useful, but </a:t>
+                </a:r>
+                <a:r>
+                  <a:rPr lang="en-US" dirty="0" smtClean="0"/>
+                  <a:t>only </a:t>
+                </a:r>
+                <a:r>
+                  <a:rPr lang="en-US" dirty="0" smtClean="0"/>
+                  <a:t>for reference</a:t>
+                </a:r>
+                <a:endParaRPr lang="en-US" dirty="0" smtClean="0"/>
+              </a:p>
+              <a:p>
+                <a:r>
+                  <a:rPr lang="en-US" dirty="0"/>
+                  <a:t> S</a:t>
+                </a:r>
+                <a:r>
+                  <a:rPr lang="en-US" dirty="0" smtClean="0"/>
+                  <a:t>amples are dependent for one method</a:t>
+                </a:r>
+              </a:p>
+              <a:p>
+                <a:r>
+                  <a:rPr lang="en-US" dirty="0"/>
+                  <a:t> </a:t>
+                </a:r>
+                <a:r>
+                  <a:rPr lang="en-US" dirty="0" smtClean="0"/>
+                  <a:t>Resort to running in sequence for </a:t>
+                </a:r>
+                <a:r>
+                  <a:rPr lang="en-US" dirty="0" smtClean="0"/>
+                  <a:t>calibration methods </a:t>
+                </a:r>
+                <a:r>
+                  <a:rPr lang="en-US" dirty="0" smtClean="0"/>
+                  <a:t>(</a:t>
+                </a:r>
+                <a14:m>
+                  <m:oMath xmlns:m="http://schemas.openxmlformats.org/officeDocument/2006/math">
+                    <m:sSup>
+                      <m:sSupPr>
+                        <m:ctrlPr>
+                          <a:rPr lang="en-US" i="1" smtClean="0">
+                            <a:latin typeface="Cambria Math" panose="02040503050406030204" pitchFamily="18" charset="0"/>
+                          </a:rPr>
+                        </m:ctrlPr>
+                      </m:sSupPr>
+                      <m:e>
+                        <m:r>
+                          <a:rPr lang="en-US" b="0" i="1" smtClean="0">
+                            <a:latin typeface="Cambria Math" panose="02040503050406030204" pitchFamily="18" charset="0"/>
+                          </a:rPr>
+                          <m:t>10</m:t>
+                        </m:r>
+                        <m:r>
+                          <a:rPr lang="en-US" b="0" i="1" smtClean="0">
+                            <a:latin typeface="Cambria Math" panose="02040503050406030204" pitchFamily="18" charset="0"/>
+                          </a:rPr>
+                          <m:t>𝑒</m:t>
+                        </m:r>
+                      </m:e>
+                      <m:sup>
+                        <m:r>
+                          <a:rPr lang="en-US" b="0" i="1" smtClean="0">
+                            <a:latin typeface="Cambria Math" panose="02040503050406030204" pitchFamily="18" charset="0"/>
+                          </a:rPr>
+                          <m:t>4</m:t>
+                        </m:r>
+                      </m:sup>
+                    </m:sSup>
+                  </m:oMath>
+                </a14:m>
+                <a:r>
+                  <a:rPr lang="en-US" dirty="0" smtClean="0"/>
+                  <a:t>)</a:t>
+                </a:r>
+              </a:p>
+              <a:p>
+                <a:r>
+                  <a:rPr lang="en-US" dirty="0"/>
+                  <a:t> </a:t>
+                </a:r>
+                <a:r>
+                  <a:rPr lang="en-US" dirty="0" smtClean="0"/>
+                  <a:t>Requires about </a:t>
+                </a:r>
+                <a14:m>
+                  <m:oMath xmlns:m="http://schemas.openxmlformats.org/officeDocument/2006/math">
+                    <m:r>
+                      <a:rPr lang="en-US" b="0" i="1" smtClean="0">
+                        <a:latin typeface="Cambria Math" panose="02040503050406030204" pitchFamily="18" charset="0"/>
+                        <a:ea typeface="Cambria Math" panose="02040503050406030204" pitchFamily="18" charset="0"/>
+                      </a:rPr>
+                      <m:t>83.3</m:t>
+                    </m:r>
+                    <m:r>
+                      <a:rPr lang="en-US" b="0" i="1" smtClean="0">
+                        <a:latin typeface="Cambria Math" panose="02040503050406030204" pitchFamily="18" charset="0"/>
+                        <a:ea typeface="Cambria Math" panose="02040503050406030204" pitchFamily="18" charset="0"/>
+                      </a:rPr>
+                      <m:t>𝑠</m:t>
+                    </m:r>
+                  </m:oMath>
+                </a14:m>
+                <a:r>
+                  <a:rPr lang="en-ZA" dirty="0" smtClean="0"/>
+                  <a:t> for R_ABC</a:t>
+                </a:r>
+              </a:p>
+              <a:p>
+                <a:r>
+                  <a:rPr lang="en-US" dirty="0"/>
+                  <a:t> </a:t>
+                </a:r>
+                <a:r>
+                  <a:rPr lang="en-US" dirty="0" smtClean="0"/>
+                  <a:t>May be more for S_ABC and BML</a:t>
+                </a:r>
+                <a:r>
+                  <a:rPr lang="en-US" sz="2400" dirty="0" smtClean="0"/>
+                  <a:t>E</a:t>
+                </a:r>
+                <a:endParaRPr lang="en-ZA" sz="2400" dirty="0"/>
+              </a:p>
+            </p:txBody>
+          </p:sp>
+        </mc:Choice>
+        <mc:Fallback>
+          <p:sp>
+            <p:nvSpPr>
+              <p:cNvPr id="7" name="Content Placeholder 6"/>
+              <p:cNvSpPr>
+                <a:spLocks noGrp="1" noRot="1" noChangeAspect="1" noMove="1" noResize="1" noEditPoints="1" noAdjustHandles="1" noChangeArrowheads="1" noChangeShapeType="1" noTextEdit="1"/>
+              </p:cNvSpPr>
+              <p:nvPr>
+                <p:ph sz="quarter" idx="4"/>
+              </p:nvPr>
+            </p:nvSpPr>
+            <p:spPr>
+              <a:xfrm>
+                <a:off x="1064030" y="1795549"/>
+                <a:ext cx="7855526" cy="4394114"/>
+              </a:xfrm>
+              <a:blipFill>
+                <a:blip r:embed="rId2"/>
+                <a:stretch>
+                  <a:fillRect l="-1398" t="-2361"/>
+                </a:stretch>
+              </a:blipFill>
+            </p:spPr>
+            <p:txBody>
+              <a:bodyPr/>
+              <a:lstStyle/>
+              <a:p>
+                <a:r>
+                  <a:rPr lang="en-ZA">
+                    <a:noFill/>
+                  </a:rPr>
+                  <a:t> </a:t>
+                </a:r>
+              </a:p>
+            </p:txBody>
+          </p:sp>
+        </mc:Fallback>
+      </mc:AlternateContent>
+    </p:spTree>
+    <p:extLst>
+      <p:ext uri="{BB962C8B-B14F-4D97-AF65-F5344CB8AC3E}">
+        <p14:creationId xmlns:p14="http://schemas.microsoft.com/office/powerpoint/2010/main" val="4182605204"/>
       </p:ext>
     </p:extLst>
   </p:cSld>
@@ -6013,7 +6723,12 @@
             <p:ph type="title"/>
           </p:nvPr>
         </p:nvSpPr>
-        <p:spPr/>
+        <p:spPr>
+          <a:xfrm>
+            <a:off x="457200" y="65868"/>
+            <a:ext cx="10911840" cy="715528"/>
+          </a:xfrm>
+        </p:spPr>
         <p:txBody>
           <a:bodyPr/>
           <a:lstStyle/>
@@ -6038,52 +6753,1046 @@
           </a:p>
         </p:txBody>
       </p:sp>
-      <p:sp>
-        <p:nvSpPr>
-          <p:cNvPr id="3" name="Content Placeholder 2"/>
-          <p:cNvSpPr>
-            <a:spLocks noGrp="1"/>
-          </p:cNvSpPr>
-          <p:nvPr>
-            <p:ph idx="1"/>
-          </p:nvPr>
-        </p:nvSpPr>
-        <p:spPr/>
-        <p:txBody>
-          <a:bodyPr/>
+      <mc:AlternateContent xmlns:mc="http://schemas.openxmlformats.org/markup-compatibility/2006">
+        <mc:Choice xmlns:a14="http://schemas.microsoft.com/office/drawing/2010/main" Requires="a14">
+          <p:sp>
+            <p:nvSpPr>
+              <p:cNvPr id="15" name="Flowchart: Process 14"/>
+              <p:cNvSpPr/>
+              <p:nvPr/>
+            </p:nvSpPr>
+            <p:spPr>
+              <a:xfrm>
+                <a:off x="853440" y="1091610"/>
+                <a:ext cx="2069874" cy="2211185"/>
+              </a:xfrm>
+              <a:prstGeom prst="flowChartProcess">
+                <a:avLst/>
+              </a:prstGeom>
+              <a:solidFill>
+                <a:schemeClr val="bg2"/>
+              </a:solidFill>
+              <a:ln>
+                <a:solidFill>
+                  <a:schemeClr val="accent2">
+                    <a:lumMod val="75000"/>
+                  </a:schemeClr>
+                </a:solidFill>
+              </a:ln>
+            </p:spPr>
+            <p:style>
+              <a:lnRef idx="2">
+                <a:schemeClr val="accent3">
+                  <a:shade val="50000"/>
+                </a:schemeClr>
+              </a:lnRef>
+              <a:fillRef idx="1">
+                <a:schemeClr val="accent3"/>
+              </a:fillRef>
+              <a:effectRef idx="0">
+                <a:schemeClr val="accent3"/>
+              </a:effectRef>
+              <a:fontRef idx="minor">
+                <a:schemeClr val="lt1"/>
+              </a:fontRef>
+            </p:style>
+            <p:txBody>
+              <a:bodyPr rtlCol="0" anchor="ctr"/>
+              <a:lstStyle/>
+              <a:p>
+                <a:pPr algn="ctr"/>
+                <a:r>
+                  <a:rPr lang="en-US" sz="2800" dirty="0" smtClean="0">
+                    <a:solidFill>
+                      <a:schemeClr val="tx1"/>
+                    </a:solidFill>
+                  </a:rPr>
+                  <a:t>Run </a:t>
+                </a:r>
+                <a14:m>
+                  <m:oMath xmlns:m="http://schemas.openxmlformats.org/officeDocument/2006/math">
+                    <m:sSup>
+                      <m:sSupPr>
+                        <m:ctrlPr>
+                          <a:rPr lang="en-US" sz="2800" i="1" smtClean="0">
+                            <a:solidFill>
+                              <a:schemeClr val="tx1"/>
+                            </a:solidFill>
+                            <a:latin typeface="Cambria Math" panose="02040503050406030204" pitchFamily="18" charset="0"/>
+                          </a:rPr>
+                        </m:ctrlPr>
+                      </m:sSupPr>
+                      <m:e>
+                        <m:r>
+                          <a:rPr lang="en-US" sz="2800" b="0" i="1" smtClean="0">
+                            <a:solidFill>
+                              <a:schemeClr val="tx1"/>
+                            </a:solidFill>
+                            <a:latin typeface="Cambria Math" panose="02040503050406030204" pitchFamily="18" charset="0"/>
+                          </a:rPr>
+                          <m:t>10</m:t>
+                        </m:r>
+                      </m:e>
+                      <m:sup>
+                        <m:r>
+                          <a:rPr lang="en-US" sz="2800" b="0" i="1" smtClean="0">
+                            <a:solidFill>
+                              <a:schemeClr val="tx1"/>
+                            </a:solidFill>
+                            <a:latin typeface="Cambria Math" panose="02040503050406030204" pitchFamily="18" charset="0"/>
+                          </a:rPr>
+                          <m:t>6</m:t>
+                        </m:r>
+                      </m:sup>
+                    </m:sSup>
+                  </m:oMath>
+                </a14:m>
+                <a:r>
+                  <a:rPr lang="en-ZA" sz="2800" dirty="0" smtClean="0">
+                    <a:solidFill>
+                      <a:schemeClr val="tx1"/>
+                    </a:solidFill>
+                  </a:rPr>
+                  <a:t> </a:t>
+                </a:r>
+                <a:r>
+                  <a:rPr lang="en-ZA" sz="2800" dirty="0" smtClean="0">
+                    <a:solidFill>
+                      <a:schemeClr val="tx1"/>
+                    </a:solidFill>
+                  </a:rPr>
+                  <a:t>simulations</a:t>
+                </a:r>
+              </a:p>
+              <a:p>
+                <a:pPr algn="ctr"/>
+                <a:r>
+                  <a:rPr lang="en-US" sz="2800" dirty="0" smtClean="0">
+                    <a:solidFill>
+                      <a:schemeClr val="tx1"/>
+                    </a:solidFill>
+                  </a:rPr>
+                  <a:t>for reference</a:t>
+                </a:r>
+                <a:endParaRPr lang="en-ZA" sz="2800" dirty="0">
+                  <a:solidFill>
+                    <a:schemeClr val="tx1"/>
+                  </a:solidFill>
+                </a:endParaRPr>
+              </a:p>
+            </p:txBody>
+          </p:sp>
+        </mc:Choice>
+        <mc:Fallback>
+          <p:sp>
+            <p:nvSpPr>
+              <p:cNvPr id="15" name="Flowchart: Process 14"/>
+              <p:cNvSpPr>
+                <a:spLocks noRot="1" noChangeAspect="1" noMove="1" noResize="1" noEditPoints="1" noAdjustHandles="1" noChangeArrowheads="1" noChangeShapeType="1" noTextEdit="1"/>
+              </p:cNvSpPr>
+              <p:nvPr/>
+            </p:nvSpPr>
+            <p:spPr>
+              <a:xfrm>
+                <a:off x="853440" y="1091610"/>
+                <a:ext cx="2069874" cy="2211185"/>
+              </a:xfrm>
+              <a:prstGeom prst="flowChartProcess">
+                <a:avLst/>
+              </a:prstGeom>
+              <a:blipFill>
+                <a:blip r:embed="rId2"/>
+                <a:stretch>
+                  <a:fillRect l="-5263" r="-4971"/>
+                </a:stretch>
+              </a:blipFill>
+              <a:ln>
+                <a:solidFill>
+                  <a:schemeClr val="accent2">
+                    <a:lumMod val="75000"/>
+                  </a:schemeClr>
+                </a:solidFill>
+              </a:ln>
+            </p:spPr>
+            <p:txBody>
+              <a:bodyPr/>
+              <a:lstStyle/>
+              <a:p>
+                <a:r>
+                  <a:rPr lang="en-ZA">
+                    <a:noFill/>
+                  </a:rPr>
+                  <a:t> </a:t>
+                </a:r>
+              </a:p>
+            </p:txBody>
+          </p:sp>
+        </mc:Fallback>
+      </mc:AlternateContent>
+      <p:sp>
+        <p:nvSpPr>
+          <p:cNvPr id="16" name="Right Arrow 15"/>
+          <p:cNvSpPr/>
+          <p:nvPr/>
+        </p:nvSpPr>
+        <p:spPr>
+          <a:xfrm>
+            <a:off x="2942423" y="1752168"/>
+            <a:ext cx="797200" cy="484632"/>
+          </a:xfrm>
+          <a:prstGeom prst="rightArrow">
+            <a:avLst/>
+          </a:prstGeom>
+          <a:solidFill>
+            <a:schemeClr val="tx1">
+              <a:lumMod val="50000"/>
+              <a:lumOff val="50000"/>
+            </a:schemeClr>
+          </a:solidFill>
+        </p:spPr>
+        <p:style>
+          <a:lnRef idx="2">
+            <a:schemeClr val="accent2">
+              <a:shade val="50000"/>
+            </a:schemeClr>
+          </a:lnRef>
+          <a:fillRef idx="1">
+            <a:schemeClr val="accent2"/>
+          </a:fillRef>
+          <a:effectRef idx="0">
+            <a:schemeClr val="accent2"/>
+          </a:effectRef>
+          <a:fontRef idx="minor">
+            <a:schemeClr val="lt1"/>
+          </a:fontRef>
+        </p:style>
+        <p:txBody>
+          <a:bodyPr rtlCol="0" anchor="ctr"/>
           <a:lstStyle/>
           <a:p>
-            <a:pPr lvl="1"/>
-            <a:r>
-              <a:rPr lang="en-US" dirty="0" smtClean="0"/>
-              <a:t> Run the other methods</a:t>
-            </a:r>
-          </a:p>
-          <a:p>
-            <a:pPr lvl="1"/>
-            <a:r>
-              <a:rPr lang="en-US" dirty="0" smtClean="0"/>
-              <a:t> Save posterior</a:t>
-            </a:r>
-          </a:p>
-          <a:p>
-            <a:pPr lvl="1"/>
-            <a:r>
-              <a:rPr lang="en-US" dirty="0"/>
-              <a:t> </a:t>
-            </a:r>
-            <a:r>
-              <a:rPr lang="en-US" dirty="0" smtClean="0"/>
-              <a:t>Produce plots</a:t>
-            </a:r>
-          </a:p>
-          <a:p>
-            <a:pPr lvl="1"/>
-            <a:r>
-              <a:rPr lang="en-US" dirty="0" smtClean="0"/>
-              <a:t> Organize outputs</a:t>
-            </a:r>
-            <a:endParaRPr lang="en-ZA" dirty="0"/>
+            <a:pPr algn="ctr"/>
+            <a:endParaRPr lang="en-ZA"/>
+          </a:p>
+        </p:txBody>
+      </p:sp>
+      <mc:AlternateContent xmlns:mc="http://schemas.openxmlformats.org/markup-compatibility/2006">
+        <mc:Choice xmlns:a14="http://schemas.microsoft.com/office/drawing/2010/main" Requires="a14">
+          <p:sp>
+            <p:nvSpPr>
+              <p:cNvPr id="17" name="Flowchart: Process 16"/>
+              <p:cNvSpPr/>
+              <p:nvPr/>
+            </p:nvSpPr>
+            <p:spPr>
+              <a:xfrm>
+                <a:off x="3720635" y="1049743"/>
+                <a:ext cx="2161313" cy="2211184"/>
+              </a:xfrm>
+              <a:prstGeom prst="flowChartProcess">
+                <a:avLst/>
+              </a:prstGeom>
+              <a:solidFill>
+                <a:schemeClr val="bg2"/>
+              </a:solidFill>
+            </p:spPr>
+            <p:style>
+              <a:lnRef idx="2">
+                <a:schemeClr val="accent2">
+                  <a:shade val="50000"/>
+                </a:schemeClr>
+              </a:lnRef>
+              <a:fillRef idx="1">
+                <a:schemeClr val="accent2"/>
+              </a:fillRef>
+              <a:effectRef idx="0">
+                <a:schemeClr val="accent2"/>
+              </a:effectRef>
+              <a:fontRef idx="minor">
+                <a:schemeClr val="lt1"/>
+              </a:fontRef>
+            </p:style>
+            <p:txBody>
+              <a:bodyPr rtlCol="0" anchor="ctr"/>
+              <a:lstStyle/>
+              <a:p>
+                <a:pPr algn="ctr"/>
+                <a:r>
+                  <a:rPr lang="en-US" sz="2800" dirty="0" smtClean="0">
+                    <a:solidFill>
+                      <a:schemeClr val="tx1"/>
+                    </a:solidFill>
+                  </a:rPr>
+                  <a:t>Retain </a:t>
+                </a:r>
+                <a14:m>
+                  <m:oMath xmlns:m="http://schemas.openxmlformats.org/officeDocument/2006/math">
+                    <m:sSup>
+                      <m:sSupPr>
+                        <m:ctrlPr>
+                          <a:rPr lang="en-US" sz="2800" i="1">
+                            <a:solidFill>
+                              <a:schemeClr val="tx1"/>
+                            </a:solidFill>
+                            <a:latin typeface="Cambria Math" panose="02040503050406030204" pitchFamily="18" charset="0"/>
+                          </a:rPr>
+                        </m:ctrlPr>
+                      </m:sSupPr>
+                      <m:e>
+                        <m:r>
+                          <a:rPr lang="en-US" sz="2800" i="1">
+                            <a:solidFill>
+                              <a:schemeClr val="tx1"/>
+                            </a:solidFill>
+                            <a:latin typeface="Cambria Math" panose="02040503050406030204" pitchFamily="18" charset="0"/>
+                          </a:rPr>
+                          <m:t>10</m:t>
+                        </m:r>
+                      </m:e>
+                      <m:sup>
+                        <m:r>
+                          <a:rPr lang="en-US" sz="2800" i="1">
+                            <a:solidFill>
+                              <a:schemeClr val="tx1"/>
+                            </a:solidFill>
+                            <a:latin typeface="Cambria Math" panose="02040503050406030204" pitchFamily="18" charset="0"/>
+                          </a:rPr>
+                          <m:t>6</m:t>
+                        </m:r>
+                      </m:sup>
+                    </m:sSup>
+                  </m:oMath>
+                </a14:m>
+                <a:r>
+                  <a:rPr lang="en-US" sz="2800" dirty="0" smtClean="0">
+                    <a:solidFill>
+                      <a:schemeClr val="tx1"/>
+                    </a:solidFill>
+                  </a:rPr>
+                  <a:t> parameter combinations</a:t>
+                </a:r>
+              </a:p>
+              <a:p>
+                <a:pPr algn="ctr"/>
+                <a:r>
+                  <a:rPr lang="en-US" sz="2800" dirty="0" smtClean="0">
+                    <a:solidFill>
+                      <a:schemeClr val="tx1"/>
+                    </a:solidFill>
+                  </a:rPr>
+                  <a:t>(posterior)</a:t>
+                </a:r>
+                <a:endParaRPr lang="en-ZA" sz="2800" dirty="0">
+                  <a:solidFill>
+                    <a:schemeClr val="tx1"/>
+                  </a:solidFill>
+                </a:endParaRPr>
+              </a:p>
+            </p:txBody>
+          </p:sp>
+        </mc:Choice>
+        <mc:Fallback>
+          <p:sp>
+            <p:nvSpPr>
+              <p:cNvPr id="17" name="Flowchart: Process 16"/>
+              <p:cNvSpPr>
+                <a:spLocks noRot="1" noChangeAspect="1" noMove="1" noResize="1" noEditPoints="1" noAdjustHandles="1" noChangeArrowheads="1" noChangeShapeType="1" noTextEdit="1"/>
+              </p:cNvSpPr>
+              <p:nvPr/>
+            </p:nvSpPr>
+            <p:spPr>
+              <a:xfrm>
+                <a:off x="3720635" y="1049743"/>
+                <a:ext cx="2161313" cy="2211184"/>
+              </a:xfrm>
+              <a:prstGeom prst="flowChartProcess">
+                <a:avLst/>
+              </a:prstGeom>
+              <a:blipFill>
+                <a:blip r:embed="rId3"/>
+                <a:stretch>
+                  <a:fillRect l="-4482" r="-4482"/>
+                </a:stretch>
+              </a:blipFill>
+            </p:spPr>
+            <p:txBody>
+              <a:bodyPr/>
+              <a:lstStyle/>
+              <a:p>
+                <a:r>
+                  <a:rPr lang="en-ZA">
+                    <a:noFill/>
+                  </a:rPr>
+                  <a:t> </a:t>
+                </a:r>
+              </a:p>
+            </p:txBody>
+          </p:sp>
+        </mc:Fallback>
+      </mc:AlternateContent>
+      <p:sp>
+        <p:nvSpPr>
+          <p:cNvPr id="18" name="Right Arrow 17"/>
+          <p:cNvSpPr/>
+          <p:nvPr/>
+        </p:nvSpPr>
+        <p:spPr>
+          <a:xfrm>
+            <a:off x="5909374" y="1752168"/>
+            <a:ext cx="858567" cy="484632"/>
+          </a:xfrm>
+          <a:prstGeom prst="rightArrow">
+            <a:avLst/>
+          </a:prstGeom>
+          <a:solidFill>
+            <a:schemeClr val="tx1">
+              <a:lumMod val="50000"/>
+              <a:lumOff val="50000"/>
+            </a:schemeClr>
+          </a:solidFill>
+        </p:spPr>
+        <p:style>
+          <a:lnRef idx="2">
+            <a:schemeClr val="accent2">
+              <a:shade val="50000"/>
+            </a:schemeClr>
+          </a:lnRef>
+          <a:fillRef idx="1">
+            <a:schemeClr val="accent2"/>
+          </a:fillRef>
+          <a:effectRef idx="0">
+            <a:schemeClr val="accent2"/>
+          </a:effectRef>
+          <a:fontRef idx="minor">
+            <a:schemeClr val="lt1"/>
+          </a:fontRef>
+        </p:style>
+        <p:txBody>
+          <a:bodyPr rtlCol="0" anchor="ctr"/>
+          <a:lstStyle/>
+          <a:p>
+            <a:pPr algn="ctr"/>
+            <a:endParaRPr lang="en-ZA"/>
+          </a:p>
+        </p:txBody>
+      </p:sp>
+      <p:sp>
+        <p:nvSpPr>
+          <p:cNvPr id="19" name="Flowchart: Process 18"/>
+          <p:cNvSpPr/>
+          <p:nvPr/>
+        </p:nvSpPr>
+        <p:spPr>
+          <a:xfrm>
+            <a:off x="6788435" y="1049743"/>
+            <a:ext cx="1995054" cy="2211184"/>
+          </a:xfrm>
+          <a:prstGeom prst="flowChartProcess">
+            <a:avLst/>
+          </a:prstGeom>
+          <a:solidFill>
+            <a:schemeClr val="bg2"/>
+          </a:solidFill>
+        </p:spPr>
+        <p:style>
+          <a:lnRef idx="2">
+            <a:schemeClr val="accent2">
+              <a:shade val="50000"/>
+            </a:schemeClr>
+          </a:lnRef>
+          <a:fillRef idx="1">
+            <a:schemeClr val="accent2"/>
+          </a:fillRef>
+          <a:effectRef idx="0">
+            <a:schemeClr val="accent2"/>
+          </a:effectRef>
+          <a:fontRef idx="minor">
+            <a:schemeClr val="lt1"/>
+          </a:fontRef>
+        </p:style>
+        <p:txBody>
+          <a:bodyPr rtlCol="0" anchor="ctr"/>
+          <a:lstStyle/>
+          <a:p>
+            <a:pPr algn="ctr"/>
+            <a:r>
+              <a:rPr lang="en-US" sz="2800" dirty="0" smtClean="0">
+                <a:solidFill>
+                  <a:schemeClr val="tx1"/>
+                </a:solidFill>
+              </a:rPr>
+              <a:t>Save </a:t>
+            </a:r>
+            <a:r>
+              <a:rPr lang="en-US" sz="2800" dirty="0" smtClean="0">
+                <a:solidFill>
+                  <a:schemeClr val="tx1"/>
+                </a:solidFill>
+              </a:rPr>
+              <a:t>posterior </a:t>
+            </a:r>
+            <a:r>
+              <a:rPr lang="en-US" sz="2800" dirty="0" smtClean="0">
+                <a:solidFill>
+                  <a:schemeClr val="tx1"/>
+                </a:solidFill>
+              </a:rPr>
+              <a:t>for comparison</a:t>
+            </a:r>
+            <a:endParaRPr lang="en-ZA" sz="2800" dirty="0">
+              <a:solidFill>
+                <a:schemeClr val="tx1"/>
+              </a:solidFill>
+            </a:endParaRPr>
+          </a:p>
+        </p:txBody>
+      </p:sp>
+      <p:sp>
+        <p:nvSpPr>
+          <p:cNvPr id="20" name="Right Arrow 19"/>
+          <p:cNvSpPr/>
+          <p:nvPr/>
+        </p:nvSpPr>
+        <p:spPr>
+          <a:xfrm>
+            <a:off x="8817849" y="1752168"/>
+            <a:ext cx="750639" cy="484632"/>
+          </a:xfrm>
+          <a:prstGeom prst="rightArrow">
+            <a:avLst/>
+          </a:prstGeom>
+          <a:solidFill>
+            <a:schemeClr val="tx1">
+              <a:lumMod val="50000"/>
+              <a:lumOff val="50000"/>
+            </a:schemeClr>
+          </a:solidFill>
+        </p:spPr>
+        <p:style>
+          <a:lnRef idx="2">
+            <a:schemeClr val="accent2">
+              <a:shade val="50000"/>
+            </a:schemeClr>
+          </a:lnRef>
+          <a:fillRef idx="1">
+            <a:schemeClr val="accent2"/>
+          </a:fillRef>
+          <a:effectRef idx="0">
+            <a:schemeClr val="accent2"/>
+          </a:effectRef>
+          <a:fontRef idx="minor">
+            <a:schemeClr val="lt1"/>
+          </a:fontRef>
+        </p:style>
+        <p:txBody>
+          <a:bodyPr rtlCol="0" anchor="ctr"/>
+          <a:lstStyle/>
+          <a:p>
+            <a:pPr algn="ctr"/>
+            <a:endParaRPr lang="en-ZA"/>
+          </a:p>
+        </p:txBody>
+      </p:sp>
+      <p:sp>
+        <p:nvSpPr>
+          <p:cNvPr id="21" name="Flowchart: Process 20"/>
+          <p:cNvSpPr/>
+          <p:nvPr/>
+        </p:nvSpPr>
+        <p:spPr>
+          <a:xfrm>
+            <a:off x="6788435" y="3880745"/>
+            <a:ext cx="1995054" cy="2211184"/>
+          </a:xfrm>
+          <a:prstGeom prst="flowChartProcess">
+            <a:avLst/>
+          </a:prstGeom>
+          <a:solidFill>
+            <a:schemeClr val="accent2">
+              <a:lumMod val="60000"/>
+              <a:lumOff val="40000"/>
+            </a:schemeClr>
+          </a:solidFill>
+        </p:spPr>
+        <p:style>
+          <a:lnRef idx="2">
+            <a:schemeClr val="accent2">
+              <a:shade val="50000"/>
+            </a:schemeClr>
+          </a:lnRef>
+          <a:fillRef idx="1">
+            <a:schemeClr val="accent2"/>
+          </a:fillRef>
+          <a:effectRef idx="0">
+            <a:schemeClr val="accent2"/>
+          </a:effectRef>
+          <a:fontRef idx="minor">
+            <a:schemeClr val="lt1"/>
+          </a:fontRef>
+        </p:style>
+        <p:txBody>
+          <a:bodyPr rtlCol="0" anchor="ctr"/>
+          <a:lstStyle/>
+          <a:p>
+            <a:pPr algn="ctr"/>
+            <a:r>
+              <a:rPr lang="en-US" sz="2800" dirty="0" smtClean="0">
+                <a:solidFill>
+                  <a:schemeClr val="tx1"/>
+                </a:solidFill>
+              </a:rPr>
+              <a:t>Produce </a:t>
+            </a:r>
+            <a:r>
+              <a:rPr lang="en-US" sz="2800" dirty="0" smtClean="0">
+                <a:solidFill>
+                  <a:schemeClr val="tx1"/>
+                </a:solidFill>
+              </a:rPr>
+              <a:t>plots for comparison</a:t>
+            </a:r>
+            <a:endParaRPr lang="en-ZA" sz="2800" dirty="0">
+              <a:solidFill>
+                <a:schemeClr val="tx1"/>
+              </a:solidFill>
+            </a:endParaRPr>
+          </a:p>
+        </p:txBody>
+      </p:sp>
+      <mc:AlternateContent xmlns:mc="http://schemas.openxmlformats.org/markup-compatibility/2006">
+        <mc:Choice xmlns:a14="http://schemas.microsoft.com/office/drawing/2010/main" Requires="a14">
+          <p:sp>
+            <p:nvSpPr>
+              <p:cNvPr id="22" name="Flowchart: Process 21"/>
+              <p:cNvSpPr/>
+              <p:nvPr/>
+            </p:nvSpPr>
+            <p:spPr>
+              <a:xfrm>
+                <a:off x="9595914" y="1049743"/>
+                <a:ext cx="1897795" cy="2211184"/>
+              </a:xfrm>
+              <a:prstGeom prst="flowChartProcess">
+                <a:avLst/>
+              </a:prstGeom>
+              <a:solidFill>
+                <a:schemeClr val="accent2">
+                  <a:lumMod val="60000"/>
+                  <a:lumOff val="40000"/>
+                </a:schemeClr>
+              </a:solidFill>
+            </p:spPr>
+            <p:style>
+              <a:lnRef idx="2">
+                <a:schemeClr val="accent2">
+                  <a:shade val="50000"/>
+                </a:schemeClr>
+              </a:lnRef>
+              <a:fillRef idx="1">
+                <a:schemeClr val="accent2"/>
+              </a:fillRef>
+              <a:effectRef idx="0">
+                <a:schemeClr val="accent2"/>
+              </a:effectRef>
+              <a:fontRef idx="minor">
+                <a:schemeClr val="lt1"/>
+              </a:fontRef>
+            </p:style>
+            <p:txBody>
+              <a:bodyPr rtlCol="0" anchor="ctr"/>
+              <a:lstStyle/>
+              <a:p>
+                <a:pPr algn="ctr"/>
+                <a:r>
+                  <a:rPr lang="en-US" sz="2800" dirty="0" smtClean="0">
+                    <a:solidFill>
+                      <a:schemeClr val="tx1"/>
+                    </a:solidFill>
+                  </a:rPr>
+                  <a:t>Run </a:t>
+                </a:r>
+                <a14:m>
+                  <m:oMath xmlns:m="http://schemas.openxmlformats.org/officeDocument/2006/math">
+                    <m:sSup>
+                      <m:sSupPr>
+                        <m:ctrlPr>
+                          <a:rPr lang="en-US" sz="2800" i="1">
+                            <a:solidFill>
+                              <a:schemeClr val="tx1"/>
+                            </a:solidFill>
+                            <a:latin typeface="Cambria Math" panose="02040503050406030204" pitchFamily="18" charset="0"/>
+                          </a:rPr>
+                        </m:ctrlPr>
+                      </m:sSupPr>
+                      <m:e>
+                        <m:r>
+                          <a:rPr lang="en-US" sz="2800" i="1">
+                            <a:solidFill>
+                              <a:schemeClr val="tx1"/>
+                            </a:solidFill>
+                            <a:latin typeface="Cambria Math" panose="02040503050406030204" pitchFamily="18" charset="0"/>
+                          </a:rPr>
+                          <m:t>10</m:t>
+                        </m:r>
+                      </m:e>
+                      <m:sup>
+                        <m:r>
+                          <a:rPr lang="en-US" sz="2800" i="1">
+                            <a:solidFill>
+                              <a:schemeClr val="tx1"/>
+                            </a:solidFill>
+                            <a:latin typeface="Cambria Math" panose="02040503050406030204" pitchFamily="18" charset="0"/>
+                          </a:rPr>
+                          <m:t>6</m:t>
+                        </m:r>
+                      </m:sup>
+                    </m:sSup>
+                  </m:oMath>
+                </a14:m>
+                <a:r>
+                  <a:rPr lang="en-US" sz="2800" dirty="0" smtClean="0">
+                    <a:solidFill>
+                      <a:schemeClr val="tx1"/>
+                    </a:solidFill>
+                  </a:rPr>
+                  <a:t> simulations for each calibration methods</a:t>
+                </a:r>
+                <a:endParaRPr lang="en-ZA" sz="2800" dirty="0">
+                  <a:solidFill>
+                    <a:schemeClr val="tx1"/>
+                  </a:solidFill>
+                </a:endParaRPr>
+              </a:p>
+            </p:txBody>
+          </p:sp>
+        </mc:Choice>
+        <mc:Fallback>
+          <p:sp>
+            <p:nvSpPr>
+              <p:cNvPr id="22" name="Flowchart: Process 21"/>
+              <p:cNvSpPr>
+                <a:spLocks noRot="1" noChangeAspect="1" noMove="1" noResize="1" noEditPoints="1" noAdjustHandles="1" noChangeArrowheads="1" noChangeShapeType="1" noTextEdit="1"/>
+              </p:cNvSpPr>
+              <p:nvPr/>
+            </p:nvSpPr>
+            <p:spPr>
+              <a:xfrm>
+                <a:off x="9595914" y="1049743"/>
+                <a:ext cx="1897795" cy="2211184"/>
+              </a:xfrm>
+              <a:prstGeom prst="flowChartProcess">
+                <a:avLst/>
+              </a:prstGeom>
+              <a:blipFill>
+                <a:blip r:embed="rId4"/>
+                <a:stretch>
+                  <a:fillRect l="-4153" t="-2466" r="-9585" b="-7945"/>
+                </a:stretch>
+              </a:blipFill>
+            </p:spPr>
+            <p:txBody>
+              <a:bodyPr/>
+              <a:lstStyle/>
+              <a:p>
+                <a:r>
+                  <a:rPr lang="en-ZA">
+                    <a:noFill/>
+                  </a:rPr>
+                  <a:t> </a:t>
+                </a:r>
+              </a:p>
+            </p:txBody>
+          </p:sp>
+        </mc:Fallback>
+      </mc:AlternateContent>
+      <p:sp>
+        <p:nvSpPr>
+          <p:cNvPr id="23" name="Down Arrow 22"/>
+          <p:cNvSpPr/>
+          <p:nvPr/>
+        </p:nvSpPr>
+        <p:spPr>
+          <a:xfrm>
+            <a:off x="10357923" y="3260927"/>
+            <a:ext cx="484632" cy="619818"/>
+          </a:xfrm>
+          <a:prstGeom prst="downArrow">
+            <a:avLst/>
+          </a:prstGeom>
+          <a:solidFill>
+            <a:schemeClr val="tx1">
+              <a:lumMod val="50000"/>
+              <a:lumOff val="50000"/>
+            </a:schemeClr>
+          </a:solidFill>
+          <a:ln>
+            <a:solidFill>
+              <a:schemeClr val="accent1"/>
+            </a:solidFill>
+          </a:ln>
+        </p:spPr>
+        <p:style>
+          <a:lnRef idx="2">
+            <a:schemeClr val="accent1">
+              <a:shade val="50000"/>
+            </a:schemeClr>
+          </a:lnRef>
+          <a:fillRef idx="1">
+            <a:schemeClr val="accent1"/>
+          </a:fillRef>
+          <a:effectRef idx="0">
+            <a:schemeClr val="accent1"/>
+          </a:effectRef>
+          <a:fontRef idx="minor">
+            <a:schemeClr val="lt1"/>
+          </a:fontRef>
+        </p:style>
+        <p:txBody>
+          <a:bodyPr rtlCol="0" anchor="ctr"/>
+          <a:lstStyle/>
+          <a:p>
+            <a:pPr algn="ctr"/>
+            <a:endParaRPr lang="en-ZA">
+              <a:solidFill>
+                <a:schemeClr val="tx1">
+                  <a:lumMod val="65000"/>
+                  <a:lumOff val="35000"/>
+                </a:schemeClr>
+              </a:solidFill>
+            </a:endParaRPr>
+          </a:p>
+        </p:txBody>
+      </p:sp>
+      <p:sp>
+        <p:nvSpPr>
+          <p:cNvPr id="24" name="Flowchart: Process 23"/>
+          <p:cNvSpPr/>
+          <p:nvPr/>
+        </p:nvSpPr>
+        <p:spPr>
+          <a:xfrm>
+            <a:off x="3720635" y="3880745"/>
+            <a:ext cx="2161313" cy="2211184"/>
+          </a:xfrm>
+          <a:prstGeom prst="flowChartProcess">
+            <a:avLst/>
+          </a:prstGeom>
+          <a:solidFill>
+            <a:schemeClr val="accent2">
+              <a:lumMod val="60000"/>
+              <a:lumOff val="40000"/>
+            </a:schemeClr>
+          </a:solidFill>
+        </p:spPr>
+        <p:style>
+          <a:lnRef idx="2">
+            <a:schemeClr val="accent2">
+              <a:shade val="50000"/>
+            </a:schemeClr>
+          </a:lnRef>
+          <a:fillRef idx="1">
+            <a:schemeClr val="accent2"/>
+          </a:fillRef>
+          <a:effectRef idx="0">
+            <a:schemeClr val="accent2"/>
+          </a:effectRef>
+          <a:fontRef idx="minor">
+            <a:schemeClr val="lt1"/>
+          </a:fontRef>
+        </p:style>
+        <p:txBody>
+          <a:bodyPr rtlCol="0" anchor="ctr"/>
+          <a:lstStyle/>
+          <a:p>
+            <a:pPr algn="ctr"/>
+            <a:r>
+              <a:rPr lang="en-US" sz="2800" dirty="0" smtClean="0">
+                <a:solidFill>
+                  <a:schemeClr val="tx1"/>
+                </a:solidFill>
+              </a:rPr>
+              <a:t>Organize outputs in one file</a:t>
+            </a:r>
+            <a:endParaRPr lang="en-ZA" sz="2800" dirty="0">
+              <a:solidFill>
+                <a:schemeClr val="tx1"/>
+              </a:solidFill>
+            </a:endParaRPr>
+          </a:p>
+        </p:txBody>
+      </p:sp>
+      <p:sp>
+        <p:nvSpPr>
+          <p:cNvPr id="25" name="Left Arrow 24"/>
+          <p:cNvSpPr/>
+          <p:nvPr/>
+        </p:nvSpPr>
+        <p:spPr>
+          <a:xfrm>
+            <a:off x="5913120" y="4608350"/>
+            <a:ext cx="854821" cy="484632"/>
+          </a:xfrm>
+          <a:prstGeom prst="leftArrow">
+            <a:avLst/>
+          </a:prstGeom>
+          <a:solidFill>
+            <a:schemeClr val="tx1">
+              <a:lumMod val="50000"/>
+              <a:lumOff val="50000"/>
+            </a:schemeClr>
+          </a:solidFill>
+          <a:ln>
+            <a:solidFill>
+              <a:schemeClr val="accent1"/>
+            </a:solidFill>
+          </a:ln>
+        </p:spPr>
+        <p:style>
+          <a:lnRef idx="2">
+            <a:schemeClr val="accent1">
+              <a:shade val="50000"/>
+            </a:schemeClr>
+          </a:lnRef>
+          <a:fillRef idx="1">
+            <a:schemeClr val="accent1"/>
+          </a:fillRef>
+          <a:effectRef idx="0">
+            <a:schemeClr val="accent1"/>
+          </a:effectRef>
+          <a:fontRef idx="minor">
+            <a:schemeClr val="lt1"/>
+          </a:fontRef>
+        </p:style>
+        <p:txBody>
+          <a:bodyPr rtlCol="0" anchor="ctr"/>
+          <a:lstStyle/>
+          <a:p>
+            <a:pPr algn="ctr"/>
+            <a:endParaRPr lang="en-ZA"/>
+          </a:p>
+        </p:txBody>
+      </p:sp>
+      <p:sp>
+        <p:nvSpPr>
+          <p:cNvPr id="26" name="Flowchart: Process 25"/>
+          <p:cNvSpPr/>
+          <p:nvPr/>
+        </p:nvSpPr>
+        <p:spPr>
+          <a:xfrm>
+            <a:off x="9595913" y="3880745"/>
+            <a:ext cx="2008653" cy="2211184"/>
+          </a:xfrm>
+          <a:prstGeom prst="flowChartProcess">
+            <a:avLst/>
+          </a:prstGeom>
+          <a:solidFill>
+            <a:schemeClr val="accent2">
+              <a:lumMod val="60000"/>
+              <a:lumOff val="40000"/>
+            </a:schemeClr>
+          </a:solidFill>
+        </p:spPr>
+        <p:style>
+          <a:lnRef idx="2">
+            <a:schemeClr val="accent2">
+              <a:shade val="50000"/>
+            </a:schemeClr>
+          </a:lnRef>
+          <a:fillRef idx="1">
+            <a:schemeClr val="accent2"/>
+          </a:fillRef>
+          <a:effectRef idx="0">
+            <a:schemeClr val="accent2"/>
+          </a:effectRef>
+          <a:fontRef idx="minor">
+            <a:schemeClr val="lt1"/>
+          </a:fontRef>
+        </p:style>
+        <p:txBody>
+          <a:bodyPr rtlCol="0" anchor="ctr"/>
+          <a:lstStyle/>
+          <a:p>
+            <a:pPr algn="ctr"/>
+            <a:r>
+              <a:rPr lang="en-US" sz="2800" dirty="0" smtClean="0">
+                <a:solidFill>
+                  <a:schemeClr val="tx1"/>
+                </a:solidFill>
+              </a:rPr>
+              <a:t>Save </a:t>
+            </a:r>
+            <a:r>
+              <a:rPr lang="en-US" sz="2800" dirty="0" smtClean="0">
+                <a:solidFill>
+                  <a:schemeClr val="tx1"/>
+                </a:solidFill>
+              </a:rPr>
+              <a:t>posterior of each method </a:t>
+            </a:r>
+            <a:r>
+              <a:rPr lang="en-US" sz="2800" dirty="0" smtClean="0">
+                <a:solidFill>
+                  <a:schemeClr val="tx1"/>
+                </a:solidFill>
+              </a:rPr>
+              <a:t>for comparison</a:t>
+            </a:r>
+            <a:endParaRPr lang="en-ZA" sz="2800" dirty="0">
+              <a:solidFill>
+                <a:schemeClr val="tx1"/>
+              </a:solidFill>
+            </a:endParaRPr>
+          </a:p>
+        </p:txBody>
+      </p:sp>
+      <p:sp>
+        <p:nvSpPr>
+          <p:cNvPr id="27" name="Left Arrow 26"/>
+          <p:cNvSpPr/>
+          <p:nvPr/>
+        </p:nvSpPr>
+        <p:spPr>
+          <a:xfrm>
+            <a:off x="8783489" y="4608350"/>
+            <a:ext cx="812424" cy="484632"/>
+          </a:xfrm>
+          <a:prstGeom prst="leftArrow">
+            <a:avLst/>
+          </a:prstGeom>
+          <a:solidFill>
+            <a:schemeClr val="tx1">
+              <a:lumMod val="50000"/>
+              <a:lumOff val="50000"/>
+            </a:schemeClr>
+          </a:solidFill>
+          <a:ln>
+            <a:solidFill>
+              <a:schemeClr val="accent1"/>
+            </a:solidFill>
+          </a:ln>
+        </p:spPr>
+        <p:style>
+          <a:lnRef idx="2">
+            <a:schemeClr val="accent1">
+              <a:shade val="50000"/>
+            </a:schemeClr>
+          </a:lnRef>
+          <a:fillRef idx="1">
+            <a:schemeClr val="accent1"/>
+          </a:fillRef>
+          <a:effectRef idx="0">
+            <a:schemeClr val="accent1"/>
+          </a:effectRef>
+          <a:fontRef idx="minor">
+            <a:schemeClr val="lt1"/>
+          </a:fontRef>
+        </p:style>
+        <p:txBody>
+          <a:bodyPr rtlCol="0" anchor="ctr"/>
+          <a:lstStyle/>
+          <a:p>
+            <a:pPr algn="ctr"/>
+            <a:endParaRPr lang="en-ZA"/>
           </a:p>
         </p:txBody>
       </p:sp>
@@ -6127,7 +7836,12 @@
             <p:ph type="title"/>
           </p:nvPr>
         </p:nvSpPr>
-        <p:spPr/>
+        <p:spPr>
+          <a:xfrm>
+            <a:off x="1379913" y="365125"/>
+            <a:ext cx="9975475" cy="1325563"/>
+          </a:xfrm>
+        </p:spPr>
         <p:txBody>
           <a:bodyPr/>
           <a:lstStyle/>
@@ -6152,295 +7866,178 @@
           </a:p>
         </p:txBody>
       </p:sp>
-      <p:sp>
-        <p:nvSpPr>
-          <p:cNvPr id="5" name="Content Placeholder 4"/>
-          <p:cNvSpPr>
-            <a:spLocks noGrp="1"/>
-          </p:cNvSpPr>
-          <p:nvPr>
-            <p:ph sz="half" idx="2"/>
-          </p:nvPr>
-        </p:nvSpPr>
-        <p:spPr>
-          <a:xfrm>
-            <a:off x="839788" y="1795549"/>
-            <a:ext cx="5157787" cy="4394114"/>
-          </a:xfrm>
-        </p:spPr>
-        <p:txBody>
-          <a:bodyPr/>
-          <a:lstStyle/>
-          <a:p>
-            <a:pPr marL="0" indent="0">
-              <a:buNone/>
-            </a:pPr>
-            <a:r>
-              <a:rPr lang="en-US" dirty="0">
-                <a:solidFill>
-                  <a:schemeClr val="accent2">
-                    <a:lumMod val="75000"/>
-                  </a:schemeClr>
-                </a:solidFill>
-              </a:rPr>
-              <a:t>Goal for SEAMS workshop</a:t>
-            </a:r>
-          </a:p>
-          <a:p>
-            <a:pPr lvl="1"/>
-            <a:r>
-              <a:rPr lang="en-US" dirty="0"/>
-              <a:t> Run simulations faster</a:t>
-            </a:r>
-          </a:p>
-          <a:p>
-            <a:pPr marL="0" indent="0">
-              <a:buNone/>
-            </a:pPr>
-            <a:r>
-              <a:rPr lang="en-US" dirty="0">
-                <a:solidFill>
-                  <a:schemeClr val="accent2">
-                    <a:lumMod val="75000"/>
-                  </a:schemeClr>
-                </a:solidFill>
-              </a:rPr>
-              <a:t>What I achieved</a:t>
-            </a:r>
-          </a:p>
-          <a:p>
-            <a:pPr lvl="1"/>
-            <a:r>
-              <a:rPr lang="en-US" dirty="0"/>
-              <a:t> Tidied up my code</a:t>
-            </a:r>
-          </a:p>
-          <a:p>
-            <a:pPr lvl="1"/>
-            <a:r>
-              <a:rPr lang="en-US" dirty="0"/>
-              <a:t> Got a functions file</a:t>
-            </a:r>
-          </a:p>
-          <a:p>
-            <a:pPr lvl="1"/>
-            <a:r>
-              <a:rPr lang="en-US" dirty="0"/>
-              <a:t> Code made shorter and neat</a:t>
-            </a:r>
-          </a:p>
-          <a:p>
-            <a:pPr lvl="1"/>
-            <a:r>
-              <a:rPr lang="en-US" dirty="0"/>
-              <a:t> Code runs faster</a:t>
-            </a:r>
-          </a:p>
-          <a:p>
-            <a:pPr lvl="1"/>
-            <a:r>
-              <a:rPr lang="en-US" dirty="0"/>
-              <a:t> Saved in binary to conserve memory</a:t>
-            </a:r>
-          </a:p>
-          <a:p>
-            <a:pPr marL="0" indent="0">
-              <a:buNone/>
-            </a:pPr>
-            <a:endParaRPr lang="en-ZA" dirty="0"/>
-          </a:p>
-        </p:txBody>
-      </p:sp>
-      <mc:AlternateContent xmlns:mc="http://schemas.openxmlformats.org/markup-compatibility/2006" xmlns:a14="http://schemas.microsoft.com/office/drawing/2010/main">
-        <mc:Choice Requires="a14">
+      <mc:AlternateContent xmlns:mc="http://schemas.openxmlformats.org/markup-compatibility/2006">
+        <mc:Choice xmlns:a14="http://schemas.microsoft.com/office/drawing/2010/main" Requires="a14">
           <p:sp>
             <p:nvSpPr>
-              <p:cNvPr id="7" name="Content Placeholder 6"/>
+              <p:cNvPr id="5" name="Content Placeholder 4"/>
               <p:cNvSpPr>
                 <a:spLocks noGrp="1"/>
               </p:cNvSpPr>
               <p:nvPr>
-                <p:ph sz="quarter" idx="4"/>
+                <p:ph sz="half" idx="2"/>
               </p:nvPr>
             </p:nvSpPr>
             <p:spPr>
               <a:xfrm>
-                <a:off x="6172200" y="1795549"/>
-                <a:ext cx="5183188" cy="4394114"/>
+                <a:off x="1928756" y="1770611"/>
+                <a:ext cx="5635826" cy="4394114"/>
               </a:xfrm>
             </p:spPr>
             <p:txBody>
-              <a:bodyPr>
-                <a:normAutofit/>
-              </a:bodyPr>
+              <a:bodyPr/>
               <a:lstStyle/>
               <a:p>
                 <a:pPr marL="0" indent="0">
                   <a:buNone/>
                 </a:pPr>
                 <a:r>
-                  <a:rPr lang="en-US" dirty="0">
+                  <a:rPr lang="en-US" sz="3200" dirty="0">
                     <a:solidFill>
                       <a:schemeClr val="accent2">
                         <a:lumMod val="75000"/>
                       </a:schemeClr>
                     </a:solidFill>
                   </a:rPr>
-                  <a:t>Was Parallelizing useful</a:t>
-                </a:r>
-                <a:r>
-                  <a:rPr lang="en-US" dirty="0" smtClean="0">
+                  <a:t>Goal for SEAMS workshop</a:t>
+                </a:r>
+              </a:p>
+              <a:p>
+                <a:pPr lvl="1"/>
+                <a:r>
+                  <a:rPr lang="en-US" sz="2800" dirty="0"/>
+                  <a:t> </a:t>
+                </a:r>
+                <a:r>
+                  <a:rPr lang="en-US" sz="2800" dirty="0" smtClean="0"/>
+                  <a:t>Run </a:t>
+                </a:r>
+                <a14:m>
+                  <m:oMath xmlns:m="http://schemas.openxmlformats.org/officeDocument/2006/math">
+                    <m:sSup>
+                      <m:sSupPr>
+                        <m:ctrlPr>
+                          <a:rPr lang="en-US" sz="2800" i="1">
+                            <a:latin typeface="Cambria Math" panose="02040503050406030204" pitchFamily="18" charset="0"/>
+                          </a:rPr>
+                        </m:ctrlPr>
+                      </m:sSupPr>
+                      <m:e>
+                        <m:r>
+                          <a:rPr lang="en-US" sz="2800" i="1">
+                            <a:latin typeface="Cambria Math" panose="02040503050406030204" pitchFamily="18" charset="0"/>
+                          </a:rPr>
+                          <m:t>10</m:t>
+                        </m:r>
+                      </m:e>
+                      <m:sup>
+                        <m:r>
+                          <a:rPr lang="en-US" sz="2800" i="1">
+                            <a:latin typeface="Cambria Math" panose="02040503050406030204" pitchFamily="18" charset="0"/>
+                          </a:rPr>
+                          <m:t>6</m:t>
+                        </m:r>
+                      </m:sup>
+                    </m:sSup>
+                  </m:oMath>
+                </a14:m>
+                <a:r>
+                  <a:rPr lang="en-US" sz="2800" dirty="0" smtClean="0"/>
+                  <a:t> </a:t>
+                </a:r>
+                <a:r>
+                  <a:rPr lang="en-US" sz="2800" dirty="0"/>
+                  <a:t>simulations faster</a:t>
+                </a:r>
+              </a:p>
+              <a:p>
+                <a:pPr marL="0" indent="0">
+                  <a:buNone/>
+                </a:pPr>
+                <a:r>
+                  <a:rPr lang="en-US" sz="3200" dirty="0">
                     <a:solidFill>
                       <a:schemeClr val="accent2">
                         <a:lumMod val="75000"/>
                       </a:schemeClr>
                     </a:solidFill>
                   </a:rPr>
-                  <a:t>?</a:t>
-                </a:r>
-                <a:r>
-                  <a:rPr lang="en-US" dirty="0" smtClean="0"/>
-                  <a:t> </a:t>
+                  <a:t>What I achieved</a:t>
                 </a:r>
               </a:p>
               <a:p>
-                <a:r>
-                  <a:rPr lang="en-US" sz="2400" dirty="0" smtClean="0"/>
-                  <a:t>Very useful but can only be applied to the reference</a:t>
+                <a:pPr lvl="1"/>
+                <a:r>
+                  <a:rPr lang="en-US" dirty="0"/>
+                  <a:t> </a:t>
+                </a:r>
+                <a:r>
+                  <a:rPr lang="en-US" sz="2800" dirty="0"/>
+                  <a:t>Tidied up my code</a:t>
                 </a:r>
               </a:p>
               <a:p>
-                <a:r>
-                  <a:rPr lang="en-US" sz="2400" dirty="0"/>
-                  <a:t> S</a:t>
-                </a:r>
-                <a:r>
-                  <a:rPr lang="en-US" sz="2400" dirty="0" smtClean="0"/>
-                  <a:t>amples are dependent for one method</a:t>
+                <a:pPr lvl="1"/>
+                <a:r>
+                  <a:rPr lang="en-US" sz="2800" dirty="0"/>
+                  <a:t> Got a functions file</a:t>
                 </a:r>
               </a:p>
               <a:p>
-                <a:r>
-                  <a:rPr lang="en-US" sz="2400" dirty="0"/>
-                  <a:t> </a:t>
-                </a:r>
-                <a:r>
-                  <a:rPr lang="en-US" sz="2400" dirty="0" smtClean="0"/>
-                  <a:t>Resort to running in sequence for methods (</a:t>
-                </a:r>
-                <a14:m>
-                  <m:oMath xmlns:m="http://schemas.openxmlformats.org/officeDocument/2006/math">
-                    <m:sSup>
-                      <m:sSupPr>
-                        <m:ctrlPr>
-                          <a:rPr lang="en-US" sz="2400" i="1" smtClean="0">
-                            <a:latin typeface="Cambria Math" panose="02040503050406030204" pitchFamily="18" charset="0"/>
-                          </a:rPr>
-                        </m:ctrlPr>
-                      </m:sSupPr>
-                      <m:e>
-                        <m:r>
-                          <a:rPr lang="en-US" sz="2400" b="0" i="1" smtClean="0">
-                            <a:latin typeface="Cambria Math" panose="02040503050406030204" pitchFamily="18" charset="0"/>
-                          </a:rPr>
-                          <m:t>10</m:t>
-                        </m:r>
-                        <m:r>
-                          <a:rPr lang="en-US" sz="2400" b="0" i="1" smtClean="0">
-                            <a:latin typeface="Cambria Math" panose="02040503050406030204" pitchFamily="18" charset="0"/>
-                          </a:rPr>
-                          <m:t>𝑒</m:t>
-                        </m:r>
-                      </m:e>
-                      <m:sup>
-                        <m:r>
-                          <a:rPr lang="en-US" sz="2400" b="0" i="1" smtClean="0">
-                            <a:latin typeface="Cambria Math" panose="02040503050406030204" pitchFamily="18" charset="0"/>
-                          </a:rPr>
-                          <m:t>4</m:t>
-                        </m:r>
-                      </m:sup>
-                    </m:sSup>
-                  </m:oMath>
-                </a14:m>
-                <a:r>
-                  <a:rPr lang="en-US" sz="2400" dirty="0" smtClean="0"/>
-                  <a:t>)</a:t>
-                </a:r>
+                <a:pPr lvl="1"/>
+                <a:r>
+                  <a:rPr lang="en-US" sz="2800" dirty="0"/>
+                  <a:t> Code made shorter and </a:t>
+                </a:r>
+                <a:r>
+                  <a:rPr lang="en-US" sz="2800" dirty="0" smtClean="0"/>
+                  <a:t>neater</a:t>
+                </a:r>
+                <a:endParaRPr lang="en-US" sz="2800" dirty="0"/>
               </a:p>
               <a:p>
-                <a:r>
-                  <a:rPr lang="en-US" sz="2400" dirty="0"/>
-                  <a:t> </a:t>
-                </a:r>
-                <a:r>
-                  <a:rPr lang="en-US" sz="2400" dirty="0" smtClean="0"/>
-                  <a:t>Requires </a:t>
-                </a:r>
-                <a14:m>
-                  <m:oMath xmlns:m="http://schemas.openxmlformats.org/officeDocument/2006/math">
-                    <m:r>
-                      <a:rPr lang="en-US" sz="2400" i="1" smtClean="0">
-                        <a:latin typeface="Cambria Math" panose="02040503050406030204" pitchFamily="18" charset="0"/>
-                        <a:ea typeface="Cambria Math" panose="02040503050406030204" pitchFamily="18" charset="0"/>
-                      </a:rPr>
-                      <m:t>±</m:t>
-                    </m:r>
-                    <m:r>
-                      <a:rPr lang="en-US" sz="2400" b="0" i="1" smtClean="0">
-                        <a:latin typeface="Cambria Math" panose="02040503050406030204" pitchFamily="18" charset="0"/>
-                        <a:ea typeface="Cambria Math" panose="02040503050406030204" pitchFamily="18" charset="0"/>
-                      </a:rPr>
-                      <m:t>83.3</m:t>
-                    </m:r>
-                    <m:r>
-                      <a:rPr lang="en-US" sz="2400" b="0" i="1" smtClean="0">
-                        <a:latin typeface="Cambria Math" panose="02040503050406030204" pitchFamily="18" charset="0"/>
-                        <a:ea typeface="Cambria Math" panose="02040503050406030204" pitchFamily="18" charset="0"/>
-                      </a:rPr>
-                      <m:t>𝑠</m:t>
-                    </m:r>
-                  </m:oMath>
-                </a14:m>
-                <a:r>
-                  <a:rPr lang="en-ZA" sz="2400" dirty="0" smtClean="0"/>
-                  <a:t> for R_ABC</a:t>
+                <a:pPr lvl="1"/>
+                <a:r>
+                  <a:rPr lang="en-US" sz="2800" dirty="0"/>
+                  <a:t> Code runs faster</a:t>
                 </a:r>
               </a:p>
               <a:p>
-                <a:r>
-                  <a:rPr lang="en-US" sz="2400" dirty="0"/>
-                  <a:t> </a:t>
-                </a:r>
-                <a:r>
-                  <a:rPr lang="en-US" sz="2400" dirty="0" smtClean="0"/>
-                  <a:t>May be more for S_ABC and BMLE</a:t>
-                </a:r>
-                <a:endParaRPr lang="en-ZA" sz="2400" dirty="0"/>
+                <a:pPr lvl="1"/>
+                <a:r>
+                  <a:rPr lang="en-US" sz="2800" dirty="0"/>
+                  <a:t> Saved in binary to conserve memory</a:t>
+                </a:r>
+              </a:p>
+              <a:p>
+                <a:pPr marL="0" indent="0">
+                  <a:buNone/>
+                </a:pPr>
+                <a:endParaRPr lang="en-ZA" sz="3200" dirty="0"/>
               </a:p>
             </p:txBody>
           </p:sp>
         </mc:Choice>
-        <mc:Fallback xmlns="">
+        <mc:Fallback>
           <p:sp>
             <p:nvSpPr>
-              <p:cNvPr id="7" name="Content Placeholder 6"/>
+              <p:cNvPr id="5" name="Content Placeholder 4"/>
               <p:cNvSpPr>
                 <a:spLocks noGrp="1" noRot="1" noChangeAspect="1" noMove="1" noResize="1" noEditPoints="1" noAdjustHandles="1" noChangeArrowheads="1" noChangeShapeType="1" noTextEdit="1"/>
               </p:cNvSpPr>
               <p:nvPr>
-                <p:ph sz="quarter" idx="4"/>
+                <p:ph sz="half" idx="2"/>
               </p:nvPr>
             </p:nvSpPr>
             <p:spPr>
               <a:xfrm>
-                <a:off x="6172200" y="1795549"/>
-                <a:ext cx="5183188" cy="4394114"/>
+                <a:off x="1928756" y="1770611"/>
+                <a:ext cx="5635826" cy="4394114"/>
               </a:xfrm>
               <a:blipFill>
                 <a:blip r:embed="rId2"/>
                 <a:stretch>
-                  <a:fillRect l="-2471" t="-2361" r="-1059"/>
+                  <a:fillRect l="-2703" t="-2913"/>
                 </a:stretch>
               </a:blipFill>
             </p:spPr>
@@ -6499,7 +8096,12 @@
             <p:ph type="title"/>
           </p:nvPr>
         </p:nvSpPr>
-        <p:spPr/>
+        <p:spPr>
+          <a:xfrm>
+            <a:off x="845127" y="120852"/>
+            <a:ext cx="10515600" cy="1325563"/>
+          </a:xfrm>
+        </p:spPr>
         <p:txBody>
           <a:bodyPr/>
           <a:lstStyle/>
@@ -6512,7 +8114,47 @@
                   </a:schemeClr>
                 </a:solidFill>
               </a:rPr>
-              <a:t>Acknowledgements</a:t>
+              <a:t>Parallel </a:t>
+            </a:r>
+            <a:r>
+              <a:rPr lang="en-US" b="1" dirty="0">
+                <a:solidFill>
+                  <a:schemeClr val="accent2">
+                    <a:lumMod val="75000"/>
+                  </a:schemeClr>
+                </a:solidFill>
+              </a:rPr>
+              <a:t>C</a:t>
+            </a:r>
+            <a:r>
+              <a:rPr lang="en-US" b="1" dirty="0" smtClean="0">
+                <a:solidFill>
+                  <a:schemeClr val="accent2">
+                    <a:lumMod val="75000"/>
+                  </a:schemeClr>
+                </a:solidFill>
+              </a:rPr>
+              <a:t>ode </a:t>
+            </a:r>
+            <a:r>
+              <a:rPr lang="en-US" b="1" dirty="0">
+                <a:solidFill>
+                  <a:schemeClr val="accent2">
+                    <a:lumMod val="75000"/>
+                  </a:schemeClr>
+                </a:solidFill>
+              </a:rPr>
+              <a:t>U</a:t>
+            </a:r>
+            <a:r>
+              <a:rPr lang="en-US" b="1" dirty="0" smtClean="0">
+                <a:solidFill>
+                  <a:schemeClr val="accent2">
+                    <a:lumMod val="75000"/>
+                  </a:schemeClr>
+                </a:solidFill>
+              </a:rPr>
+              <a:t>sed</a:t>
             </a:r>
             <a:endParaRPr lang="en-ZA" b="1" dirty="0">
               <a:solidFill>
@@ -6524,128 +8166,39 @@
           </a:p>
         </p:txBody>
       </p:sp>
-      <p:sp>
-        <p:nvSpPr>
-          <p:cNvPr id="3" name="Content Placeholder 2"/>
-          <p:cNvSpPr>
-            <a:spLocks noGrp="1"/>
-          </p:cNvSpPr>
+      <p:pic>
+        <p:nvPicPr>
+          <p:cNvPr id="4" name="Content Placeholder 3"/>
+          <p:cNvPicPr>
+            <a:picLocks noGrp="1" noChangeAspect="1"/>
+          </p:cNvPicPr>
           <p:nvPr>
             <p:ph idx="1"/>
           </p:nvPr>
-        </p:nvSpPr>
-        <p:spPr/>
-        <p:txBody>
-          <a:bodyPr/>
-          <a:lstStyle/>
-          <a:p>
-            <a:r>
-              <a:rPr lang="en-US" dirty="0" smtClean="0"/>
-              <a:t> SEAMS faculty and Mentors</a:t>
-            </a:r>
-          </a:p>
-          <a:p>
-            <a:r>
-              <a:rPr lang="en-US" dirty="0"/>
-              <a:t> </a:t>
-            </a:r>
-            <a:r>
-              <a:rPr lang="en-US" dirty="0" smtClean="0"/>
-              <a:t>SACEMA</a:t>
-            </a:r>
-          </a:p>
-          <a:p>
-            <a:r>
-              <a:rPr lang="en-US" dirty="0"/>
-              <a:t> </a:t>
-            </a:r>
-            <a:r>
-              <a:rPr lang="en-US" dirty="0" smtClean="0"/>
-              <a:t>Fellow participants</a:t>
-            </a:r>
-          </a:p>
-          <a:p>
-            <a:endParaRPr lang="en-US" dirty="0"/>
-          </a:p>
-          <a:p>
-            <a:pPr marL="0" indent="0">
-              <a:buNone/>
-            </a:pPr>
-            <a:endParaRPr lang="en-ZA" dirty="0"/>
-          </a:p>
-        </p:txBody>
-      </p:sp>
-      <p:sp>
-        <p:nvSpPr>
-          <p:cNvPr id="4" name="Rectangle 3"/>
-          <p:cNvSpPr/>
-          <p:nvPr/>
-        </p:nvSpPr>
+        </p:nvPicPr>
+        <p:blipFill>
+          <a:blip r:embed="rId2">
+            <a:extLst>
+              <a:ext uri="{28A0092B-C50C-407E-A947-70E740481C1C}">
+                <a14:useLocalDpi xmlns:a14="http://schemas.microsoft.com/office/drawing/2010/main" val="0"/>
+              </a:ext>
+            </a:extLst>
+          </a:blip>
+          <a:stretch>
+            <a:fillRect/>
+          </a:stretch>
+        </p:blipFill>
         <p:spPr>
           <a:xfrm>
-            <a:off x="4355523" y="4001294"/>
-            <a:ext cx="3480953" cy="1015663"/>
+            <a:off x="2050210" y="1551305"/>
+            <a:ext cx="8105433" cy="4351338"/>
           </a:xfrm>
-          <a:prstGeom prst="rect">
-            <a:avLst/>
-          </a:prstGeom>
-          <a:noFill/>
         </p:spPr>
-        <p:txBody>
-          <a:bodyPr wrap="none" lIns="91440" tIns="45720" rIns="91440" bIns="45720">
-            <a:spAutoFit/>
-          </a:bodyPr>
-          <a:lstStyle/>
-          <a:p>
-            <a:pPr algn="ctr"/>
-            <a:r>
-              <a:rPr lang="en-US" sz="6000" b="1" dirty="0" smtClean="0">
-                <a:ln w="13462">
-                  <a:solidFill>
-                    <a:schemeClr val="bg1"/>
-                  </a:solidFill>
-                  <a:prstDash val="solid"/>
-                </a:ln>
-                <a:solidFill>
-                  <a:schemeClr val="tx1">
-                    <a:lumMod val="85000"/>
-                    <a:lumOff val="15000"/>
-                  </a:schemeClr>
-                </a:solidFill>
-                <a:effectLst>
-                  <a:outerShdw dist="38100" dir="2700000" algn="bl" rotWithShape="0">
-                    <a:schemeClr val="accent5"/>
-                  </a:outerShdw>
-                </a:effectLst>
-              </a:rPr>
-              <a:t>Thank You</a:t>
-            </a:r>
-            <a:endParaRPr lang="en-US" sz="6000" b="1" cap="none" spc="0" dirty="0">
-              <a:ln w="13462">
-                <a:solidFill>
-                  <a:schemeClr val="bg1"/>
-                </a:solidFill>
-                <a:prstDash val="solid"/>
-              </a:ln>
-              <a:solidFill>
-                <a:schemeClr val="tx1">
-                  <a:lumMod val="85000"/>
-                  <a:lumOff val="15000"/>
-                </a:schemeClr>
-              </a:solidFill>
-              <a:effectLst>
-                <a:outerShdw dist="38100" dir="2700000" algn="bl" rotWithShape="0">
-                  <a:schemeClr val="accent5"/>
-                </a:outerShdw>
-              </a:effectLst>
-            </a:endParaRPr>
-          </a:p>
-        </p:txBody>
-      </p:sp>
+      </p:pic>
     </p:spTree>
     <p:extLst>
       <p:ext uri="{BB962C8B-B14F-4D97-AF65-F5344CB8AC3E}">
-        <p14:creationId xmlns:p14="http://schemas.microsoft.com/office/powerpoint/2010/main" val="925596261"/>
+        <p14:creationId xmlns:p14="http://schemas.microsoft.com/office/powerpoint/2010/main" val="1687896869"/>
       </p:ext>
     </p:extLst>
   </p:cSld>

</xml_diff>

<commit_message>
seams last presentation final
</commit_message>
<xml_diff>
--- a/POWERPOINTS/Zenabu_SEAMS.pptx
+++ b/POWERPOINTS/Zenabu_SEAMS.pptx
@@ -3672,8 +3672,8 @@
           </a:p>
         </p:txBody>
       </p:sp>
-      <mc:AlternateContent xmlns:mc="http://schemas.openxmlformats.org/markup-compatibility/2006" xmlns:a14="http://schemas.microsoft.com/office/drawing/2010/main">
-        <mc:Choice Requires="a14">
+      <mc:AlternateContent xmlns:mc="http://schemas.openxmlformats.org/markup-compatibility/2006">
+        <mc:Choice xmlns:a14="http://schemas.microsoft.com/office/drawing/2010/main" Requires="a14">
           <p:sp>
             <p:nvSpPr>
               <p:cNvPr id="2" name="Content Placeholder 1"/>
@@ -3687,12 +3687,12 @@
             <p:spPr>
               <a:xfrm>
                 <a:off x="838200" y="1230285"/>
-                <a:ext cx="5429596" cy="4738254"/>
+                <a:ext cx="5703916" cy="4738254"/>
               </a:xfrm>
             </p:spPr>
             <p:txBody>
               <a:bodyPr>
-                <a:normAutofit lnSpcReduction="10000"/>
+                <a:normAutofit fontScale="92500" lnSpcReduction="10000"/>
               </a:bodyPr>
               <a:lstStyle/>
               <a:p>
@@ -3793,6 +3793,26 @@
                   <a:buNone/>
                 </a:pPr>
                 <a:r>
+                  <a:rPr lang="en-US" sz="3200" dirty="0" smtClean="0">
+                    <a:solidFill>
+                      <a:schemeClr val="accent2">
+                        <a:lumMod val="75000"/>
+                      </a:schemeClr>
+                    </a:solidFill>
+                  </a:rPr>
+                  <a:t>S</a:t>
+                </a:r>
+                <a:r>
+                  <a:rPr lang="en-US" sz="3200" dirty="0" smtClean="0">
+                    <a:solidFill>
+                      <a:schemeClr val="accent2">
+                        <a:lumMod val="75000"/>
+                      </a:schemeClr>
+                    </a:solidFill>
+                  </a:rPr>
+                  <a:t>tate of Project </a:t>
+                </a:r>
+                <a:r>
                   <a:rPr lang="en-US" sz="3200" dirty="0">
                     <a:solidFill>
                       <a:schemeClr val="accent2">
@@ -3800,8 +3820,25 @@
                       </a:schemeClr>
                     </a:solidFill>
                   </a:rPr>
-                  <a:t>Current state</a:t>
-                </a:r>
+                  <a:t>B</a:t>
+                </a:r>
+                <a:r>
+                  <a:rPr lang="en-US" sz="3200" dirty="0" smtClean="0">
+                    <a:solidFill>
+                      <a:schemeClr val="accent2">
+                        <a:lumMod val="75000"/>
+                      </a:schemeClr>
+                    </a:solidFill>
+                  </a:rPr>
+                  <a:t>efore SEAMS</a:t>
+                </a:r>
+                <a:endParaRPr lang="en-US" sz="3200" dirty="0">
+                  <a:solidFill>
+                    <a:schemeClr val="accent2">
+                      <a:lumMod val="75000"/>
+                    </a:schemeClr>
+                  </a:solidFill>
+                </a:endParaRPr>
               </a:p>
               <a:p>
                 <a:pPr lvl="2"/>
@@ -3842,7 +3879,7 @@
             </p:txBody>
           </p:sp>
         </mc:Choice>
-        <mc:Fallback xmlns="">
+        <mc:Fallback>
           <p:sp>
             <p:nvSpPr>
               <p:cNvPr id="2" name="Content Placeholder 1"/>
@@ -3856,12 +3893,12 @@
             <p:spPr>
               <a:xfrm>
                 <a:off x="838200" y="1230285"/>
-                <a:ext cx="5429596" cy="4738254"/>
+                <a:ext cx="5703916" cy="4738254"/>
               </a:xfrm>
               <a:blipFill>
                 <a:blip r:embed="rId2"/>
                 <a:stretch>
-                  <a:fillRect t="-4118" r="-1348"/>
+                  <a:fillRect t="-4118"/>
                 </a:stretch>
               </a:blipFill>
             </p:spPr>
@@ -3898,7 +3935,7 @@
         </p:spPr>
         <p:txBody>
           <a:bodyPr>
-            <a:normAutofit lnSpcReduction="10000"/>
+            <a:normAutofit fontScale="92500" lnSpcReduction="10000"/>
           </a:bodyPr>
           <a:lstStyle/>
           <a:p>

</xml_diff>

<commit_message>
recent work after seams
</commit_message>
<xml_diff>
--- a/POWERPOINTS/Zenabu_SEAMS.pptx
+++ b/POWERPOINTS/Zenabu_SEAMS.pptx
@@ -252,7 +252,7 @@
           <a:p>
             <a:fld id="{C78F36D2-53D7-4495-ACD2-CD4204687594}" type="datetimeFigureOut">
               <a:rPr lang="en-ZA" smtClean="0"/>
-              <a:t>2020/01/30</a:t>
+              <a:t>2020/01/31</a:t>
             </a:fld>
             <a:endParaRPr lang="en-ZA"/>
           </a:p>
@@ -422,7 +422,7 @@
           <a:p>
             <a:fld id="{C78F36D2-53D7-4495-ACD2-CD4204687594}" type="datetimeFigureOut">
               <a:rPr lang="en-ZA" smtClean="0"/>
-              <a:t>2020/01/30</a:t>
+              <a:t>2020/01/31</a:t>
             </a:fld>
             <a:endParaRPr lang="en-ZA"/>
           </a:p>
@@ -602,7 +602,7 @@
           <a:p>
             <a:fld id="{C78F36D2-53D7-4495-ACD2-CD4204687594}" type="datetimeFigureOut">
               <a:rPr lang="en-ZA" smtClean="0"/>
-              <a:t>2020/01/30</a:t>
+              <a:t>2020/01/31</a:t>
             </a:fld>
             <a:endParaRPr lang="en-ZA"/>
           </a:p>
@@ -772,7 +772,7 @@
           <a:p>
             <a:fld id="{C78F36D2-53D7-4495-ACD2-CD4204687594}" type="datetimeFigureOut">
               <a:rPr lang="en-ZA" smtClean="0"/>
-              <a:t>2020/01/30</a:t>
+              <a:t>2020/01/31</a:t>
             </a:fld>
             <a:endParaRPr lang="en-ZA"/>
           </a:p>
@@ -1018,7 +1018,7 @@
           <a:p>
             <a:fld id="{C78F36D2-53D7-4495-ACD2-CD4204687594}" type="datetimeFigureOut">
               <a:rPr lang="en-ZA" smtClean="0"/>
-              <a:t>2020/01/30</a:t>
+              <a:t>2020/01/31</a:t>
             </a:fld>
             <a:endParaRPr lang="en-ZA"/>
           </a:p>
@@ -1250,7 +1250,7 @@
           <a:p>
             <a:fld id="{C78F36D2-53D7-4495-ACD2-CD4204687594}" type="datetimeFigureOut">
               <a:rPr lang="en-ZA" smtClean="0"/>
-              <a:t>2020/01/30</a:t>
+              <a:t>2020/01/31</a:t>
             </a:fld>
             <a:endParaRPr lang="en-ZA"/>
           </a:p>
@@ -1617,7 +1617,7 @@
           <a:p>
             <a:fld id="{C78F36D2-53D7-4495-ACD2-CD4204687594}" type="datetimeFigureOut">
               <a:rPr lang="en-ZA" smtClean="0"/>
-              <a:t>2020/01/30</a:t>
+              <a:t>2020/01/31</a:t>
             </a:fld>
             <a:endParaRPr lang="en-ZA"/>
           </a:p>
@@ -1735,7 +1735,7 @@
           <a:p>
             <a:fld id="{C78F36D2-53D7-4495-ACD2-CD4204687594}" type="datetimeFigureOut">
               <a:rPr lang="en-ZA" smtClean="0"/>
-              <a:t>2020/01/30</a:t>
+              <a:t>2020/01/31</a:t>
             </a:fld>
             <a:endParaRPr lang="en-ZA"/>
           </a:p>
@@ -1830,7 +1830,7 @@
           <a:p>
             <a:fld id="{C78F36D2-53D7-4495-ACD2-CD4204687594}" type="datetimeFigureOut">
               <a:rPr lang="en-ZA" smtClean="0"/>
-              <a:t>2020/01/30</a:t>
+              <a:t>2020/01/31</a:t>
             </a:fld>
             <a:endParaRPr lang="en-ZA"/>
           </a:p>
@@ -2107,7 +2107,7 @@
           <a:p>
             <a:fld id="{C78F36D2-53D7-4495-ACD2-CD4204687594}" type="datetimeFigureOut">
               <a:rPr lang="en-ZA" smtClean="0"/>
-              <a:t>2020/01/30</a:t>
+              <a:t>2020/01/31</a:t>
             </a:fld>
             <a:endParaRPr lang="en-ZA"/>
           </a:p>
@@ -2364,7 +2364,7 @@
           <a:p>
             <a:fld id="{C78F36D2-53D7-4495-ACD2-CD4204687594}" type="datetimeFigureOut">
               <a:rPr lang="en-ZA" smtClean="0"/>
-              <a:t>2020/01/30</a:t>
+              <a:t>2020/01/31</a:t>
             </a:fld>
             <a:endParaRPr lang="en-ZA"/>
           </a:p>
@@ -2577,7 +2577,7 @@
           <a:p>
             <a:fld id="{C78F36D2-53D7-4495-ACD2-CD4204687594}" type="datetimeFigureOut">
               <a:rPr lang="en-ZA" smtClean="0"/>
-              <a:t>2020/01/30</a:t>
+              <a:t>2020/01/31</a:t>
             </a:fld>
             <a:endParaRPr lang="en-ZA"/>
           </a:p>
@@ -3672,8 +3672,8 @@
           </a:p>
         </p:txBody>
       </p:sp>
-      <mc:AlternateContent xmlns:mc="http://schemas.openxmlformats.org/markup-compatibility/2006">
-        <mc:Choice xmlns:a14="http://schemas.microsoft.com/office/drawing/2010/main" Requires="a14">
+      <mc:AlternateContent xmlns:mc="http://schemas.openxmlformats.org/markup-compatibility/2006" xmlns:a14="http://schemas.microsoft.com/office/drawing/2010/main">
+        <mc:Choice Requires="a14">
           <p:sp>
             <p:nvSpPr>
               <p:cNvPr id="2" name="Content Placeholder 1"/>
@@ -3800,17 +3800,7 @@
                       </a:schemeClr>
                     </a:solidFill>
                   </a:rPr>
-                  <a:t>S</a:t>
-                </a:r>
-                <a:r>
-                  <a:rPr lang="en-US" sz="3200" dirty="0" smtClean="0">
-                    <a:solidFill>
-                      <a:schemeClr val="accent2">
-                        <a:lumMod val="75000"/>
-                      </a:schemeClr>
-                    </a:solidFill>
-                  </a:rPr>
-                  <a:t>tate of Project </a:t>
+                  <a:t>State of Project </a:t>
                 </a:r>
                 <a:r>
                   <a:rPr lang="en-US" sz="3200" dirty="0">
@@ -3879,7 +3869,7 @@
             </p:txBody>
           </p:sp>
         </mc:Choice>
-        <mc:Fallback>
+        <mc:Fallback xmlns="">
           <p:sp>
             <p:nvSpPr>
               <p:cNvPr id="2" name="Content Placeholder 1"/>
@@ -4089,17 +4079,7 @@
                   </a:schemeClr>
                 </a:solidFill>
               </a:rPr>
-              <a:t>Flow </a:t>
-            </a:r>
-            <a:r>
-              <a:rPr lang="en-US" b="1" dirty="0" smtClean="0">
-                <a:solidFill>
-                  <a:schemeClr val="accent2">
-                    <a:lumMod val="75000"/>
-                  </a:schemeClr>
-                </a:solidFill>
-              </a:rPr>
-              <a:t>Diagram &amp; Minimum Goal</a:t>
+              <a:t>Flow Diagram &amp; Minimum Goal</a:t>
             </a:r>
             <a:endParaRPr lang="en-ZA" sz="3600" b="1" dirty="0">
               <a:solidFill>
@@ -4146,8 +4126,8 @@
           </a:p>
         </p:txBody>
       </p:sp>
-      <mc:AlternateContent xmlns:mc="http://schemas.openxmlformats.org/markup-compatibility/2006">
-        <mc:Choice xmlns:a14="http://schemas.microsoft.com/office/drawing/2010/main" Requires="a14">
+      <mc:AlternateContent xmlns:mc="http://schemas.openxmlformats.org/markup-compatibility/2006" xmlns:a14="http://schemas.microsoft.com/office/drawing/2010/main">
+        <mc:Choice Requires="a14">
           <p:sp>
             <p:nvSpPr>
               <p:cNvPr id="7" name="Flowchart: Process 6"/>
@@ -4242,15 +4222,7 @@
                       <a:schemeClr val="tx1"/>
                     </a:solidFill>
                   </a:rPr>
-                  <a:t> </a:t>
-                </a:r>
-                <a:r>
-                  <a:rPr lang="en-ZA" sz="2800" dirty="0" smtClean="0">
-                    <a:solidFill>
-                      <a:schemeClr val="tx1"/>
-                    </a:solidFill>
-                  </a:rPr>
-                  <a:t>simulations</a:t>
+                  <a:t> simulations</a:t>
                 </a:r>
               </a:p>
               <a:p>
@@ -4272,7 +4244,7 @@
             </p:txBody>
           </p:sp>
         </mc:Choice>
-        <mc:Fallback>
+        <mc:Fallback xmlns="">
           <p:sp>
             <p:nvSpPr>
               <p:cNvPr id="7" name="Flowchart: Process 6"/>
@@ -4357,8 +4329,8 @@
           </a:p>
         </p:txBody>
       </p:sp>
-      <mc:AlternateContent xmlns:mc="http://schemas.openxmlformats.org/markup-compatibility/2006">
-        <mc:Choice xmlns:a14="http://schemas.microsoft.com/office/drawing/2010/main" Requires="a14">
+      <mc:AlternateContent xmlns:mc="http://schemas.openxmlformats.org/markup-compatibility/2006" xmlns:a14="http://schemas.microsoft.com/office/drawing/2010/main">
+        <mc:Choice Requires="a14">
           <p:sp>
             <p:nvSpPr>
               <p:cNvPr id="9" name="Flowchart: Process 8"/>
@@ -4475,7 +4447,7 @@
             </p:txBody>
           </p:sp>
         </mc:Choice>
-        <mc:Fallback>
+        <mc:Fallback xmlns="">
           <p:sp>
             <p:nvSpPr>
               <p:cNvPr id="9" name="Flowchart: Process 8"/>
@@ -4664,8 +4636,8 @@
           </a:p>
         </p:txBody>
       </p:sp>
-      <mc:AlternateContent xmlns:mc="http://schemas.openxmlformats.org/markup-compatibility/2006">
-        <mc:Choice xmlns:a14="http://schemas.microsoft.com/office/drawing/2010/main" Requires="a14">
+      <mc:AlternateContent xmlns:mc="http://schemas.openxmlformats.org/markup-compatibility/2006" xmlns:a14="http://schemas.microsoft.com/office/drawing/2010/main">
+        <mc:Choice Requires="a14">
           <p:sp>
             <p:nvSpPr>
               <p:cNvPr id="14" name="Flowchart: Process 13"/>
@@ -4771,7 +4743,7 @@
             </p:txBody>
           </p:sp>
         </mc:Choice>
-        <mc:Fallback>
+        <mc:Fallback xmlns="">
           <p:sp>
             <p:nvSpPr>
               <p:cNvPr id="14" name="Flowchart: Process 13"/>
@@ -5000,8 +4972,8 @@
           </a:p>
         </p:txBody>
       </p:sp>
-      <mc:AlternateContent xmlns:mc="http://schemas.openxmlformats.org/markup-compatibility/2006">
-        <mc:Choice xmlns:a14="http://schemas.microsoft.com/office/drawing/2010/main" Requires="a14">
+      <mc:AlternateContent xmlns:mc="http://schemas.openxmlformats.org/markup-compatibility/2006" xmlns:a14="http://schemas.microsoft.com/office/drawing/2010/main">
+        <mc:Choice Requires="a14">
           <p:sp>
             <p:nvSpPr>
               <p:cNvPr id="3" name="Content Placeholder 2"/>
@@ -5051,15 +5023,7 @@
                 </a:r>
                 <a:r>
                   <a:rPr lang="en-US" sz="2800" dirty="0" smtClean="0"/>
-                  <a:t>Created</a:t>
-                </a:r>
-                <a:r>
-                  <a:rPr lang="en-US" sz="2800" dirty="0" smtClean="0"/>
-                  <a:t> </a:t>
-                </a:r>
-                <a:r>
-                  <a:rPr lang="en-US" sz="2800" dirty="0" smtClean="0"/>
-                  <a:t>README </a:t>
+                  <a:t>Created README </a:t>
                 </a:r>
               </a:p>
               <a:p>
@@ -5073,11 +5037,7 @@
                 </a:r>
                 <a:r>
                   <a:rPr lang="en-US" sz="2800" dirty="0" smtClean="0"/>
-                  <a:t>Removed </a:t>
-                </a:r>
-                <a:r>
-                  <a:rPr lang="en-US" sz="2800" dirty="0" smtClean="0"/>
-                  <a:t>code duplications </a:t>
+                  <a:t>Removed code duplications </a:t>
                 </a:r>
               </a:p>
               <a:p>
@@ -5175,7 +5135,6 @@
                   <a:rPr lang="en-ZA" sz="2800" dirty="0" smtClean="0"/>
                   <a:t> simulations </a:t>
                 </a:r>
-                <a:endParaRPr lang="en-ZA" sz="2800" dirty="0" smtClean="0"/>
               </a:p>
               <a:p>
                 <a:pPr lvl="2"/>
@@ -5211,7 +5170,7 @@
             </p:txBody>
           </p:sp>
         </mc:Choice>
-        <mc:Fallback>
+        <mc:Fallback xmlns="">
           <p:sp>
             <p:nvSpPr>
               <p:cNvPr id="3" name="Content Placeholder 2"/>
@@ -6398,15 +6357,7 @@
           <a:p>
             <a:r>
               <a:rPr lang="en-US" dirty="0" smtClean="0"/>
-              <a:t>Table 1: </a:t>
-            </a:r>
-            <a:r>
-              <a:rPr lang="en-US" dirty="0" smtClean="0"/>
-              <a:t>Runtimes </a:t>
-            </a:r>
-            <a:r>
-              <a:rPr lang="en-US" dirty="0" smtClean="0"/>
-              <a:t>for running Rejection ABC in sequence and parallel</a:t>
+              <a:t>Table 1: Runtimes for running Rejection ABC in sequence and parallel</a:t>
             </a:r>
             <a:endParaRPr lang="en-ZA" dirty="0"/>
           </a:p>
@@ -6527,8 +6478,8 @@
           </a:p>
         </p:txBody>
       </p:sp>
-      <mc:AlternateContent xmlns:mc="http://schemas.openxmlformats.org/markup-compatibility/2006">
-        <mc:Choice xmlns:a14="http://schemas.microsoft.com/office/drawing/2010/main" Requires="a14">
+      <mc:AlternateContent xmlns:mc="http://schemas.openxmlformats.org/markup-compatibility/2006" xmlns:a14="http://schemas.microsoft.com/office/drawing/2010/main">
+        <mc:Choice Requires="a14">
           <p:sp>
             <p:nvSpPr>
               <p:cNvPr id="7" name="Content Placeholder 6"/>
@@ -6553,17 +6504,8 @@
               <a:p>
                 <a:r>
                   <a:rPr lang="en-US" dirty="0" smtClean="0"/>
-                  <a:t>Very useful, but </a:t>
-                </a:r>
-                <a:r>
-                  <a:rPr lang="en-US" dirty="0" smtClean="0"/>
-                  <a:t>only </a:t>
-                </a:r>
-                <a:r>
-                  <a:rPr lang="en-US" dirty="0" smtClean="0"/>
-                  <a:t>for reference</a:t>
-                </a:r>
-                <a:endParaRPr lang="en-US" dirty="0" smtClean="0"/>
+                  <a:t>Very useful, but only for reference</a:t>
+                </a:r>
               </a:p>
               <a:p>
                 <a:r>
@@ -6582,15 +6524,7 @@
                 </a:r>
                 <a:r>
                   <a:rPr lang="en-US" dirty="0" smtClean="0"/>
-                  <a:t>Resort to running in sequence for </a:t>
-                </a:r>
-                <a:r>
-                  <a:rPr lang="en-US" dirty="0" smtClean="0"/>
-                  <a:t>calibration methods </a:t>
-                </a:r>
-                <a:r>
-                  <a:rPr lang="en-US" dirty="0" smtClean="0"/>
-                  <a:t>(</a:t>
+                  <a:t>Resort to running in sequence for calibration methods (</a:t>
                 </a:r>
                 <a14:m>
                   <m:oMath xmlns:m="http://schemas.openxmlformats.org/officeDocument/2006/math">
@@ -6682,7 +6616,7 @@
             </p:txBody>
           </p:sp>
         </mc:Choice>
-        <mc:Fallback>
+        <mc:Fallback xmlns="">
           <p:sp>
             <p:nvSpPr>
               <p:cNvPr id="7" name="Content Placeholder 6"/>
@@ -6790,8 +6724,8 @@
           </a:p>
         </p:txBody>
       </p:sp>
-      <mc:AlternateContent xmlns:mc="http://schemas.openxmlformats.org/markup-compatibility/2006">
-        <mc:Choice xmlns:a14="http://schemas.microsoft.com/office/drawing/2010/main" Requires="a14">
+      <mc:AlternateContent xmlns:mc="http://schemas.openxmlformats.org/markup-compatibility/2006" xmlns:a14="http://schemas.microsoft.com/office/drawing/2010/main">
+        <mc:Choice Requires="a14">
           <p:sp>
             <p:nvSpPr>
               <p:cNvPr id="15" name="Flowchart: Process 14"/>
@@ -6890,15 +6824,7 @@
                       <a:schemeClr val="tx1"/>
                     </a:solidFill>
                   </a:rPr>
-                  <a:t> </a:t>
-                </a:r>
-                <a:r>
-                  <a:rPr lang="en-ZA" sz="2800" dirty="0" smtClean="0">
-                    <a:solidFill>
-                      <a:schemeClr val="tx1"/>
-                    </a:solidFill>
-                  </a:rPr>
-                  <a:t>simulations</a:t>
+                  <a:t> simulations</a:t>
                 </a:r>
               </a:p>
               <a:p>
@@ -6920,7 +6846,7 @@
             </p:txBody>
           </p:sp>
         </mc:Choice>
-        <mc:Fallback>
+        <mc:Fallback xmlns="">
           <p:sp>
             <p:nvSpPr>
               <p:cNvPr id="15" name="Flowchart: Process 14"/>
@@ -7012,8 +6938,8 @@
           </a:p>
         </p:txBody>
       </p:sp>
-      <mc:AlternateContent xmlns:mc="http://schemas.openxmlformats.org/markup-compatibility/2006">
-        <mc:Choice xmlns:a14="http://schemas.microsoft.com/office/drawing/2010/main" Requires="a14">
+      <mc:AlternateContent xmlns:mc="http://schemas.openxmlformats.org/markup-compatibility/2006" xmlns:a14="http://schemas.microsoft.com/office/drawing/2010/main">
+        <mc:Choice Requires="a14">
           <p:sp>
             <p:nvSpPr>
               <p:cNvPr id="17" name="Flowchart: Process 16"/>
@@ -7127,7 +7053,7 @@
             </p:txBody>
           </p:sp>
         </mc:Choice>
-        <mc:Fallback>
+        <mc:Fallback xmlns="">
           <p:sp>
             <p:nvSpPr>
               <p:cNvPr id="17" name="Flowchart: Process 16"/>
@@ -7257,23 +7183,7 @@
                   <a:schemeClr val="tx1"/>
                 </a:solidFill>
               </a:rPr>
-              <a:t>Save </a:t>
-            </a:r>
-            <a:r>
-              <a:rPr lang="en-US" sz="2800" dirty="0" smtClean="0">
-                <a:solidFill>
-                  <a:schemeClr val="tx1"/>
-                </a:solidFill>
-              </a:rPr>
-              <a:t>posterior </a:t>
-            </a:r>
-            <a:r>
-              <a:rPr lang="en-US" sz="2800" dirty="0" smtClean="0">
-                <a:solidFill>
-                  <a:schemeClr val="tx1"/>
-                </a:solidFill>
-              </a:rPr>
-              <a:t>for comparison</a:t>
+              <a:t>Save posterior for comparison</a:t>
             </a:r>
             <a:endParaRPr lang="en-ZA" sz="2800" dirty="0">
               <a:solidFill>
@@ -7377,15 +7287,7 @@
                   <a:schemeClr val="tx1"/>
                 </a:solidFill>
               </a:rPr>
-              <a:t>Produce </a:t>
-            </a:r>
-            <a:r>
-              <a:rPr lang="en-US" sz="2800" dirty="0" smtClean="0">
-                <a:solidFill>
-                  <a:schemeClr val="tx1"/>
-                </a:solidFill>
-              </a:rPr>
-              <a:t>plots for comparison</a:t>
+              <a:t>Produce plots for comparison</a:t>
             </a:r>
             <a:endParaRPr lang="en-ZA" sz="2800" dirty="0">
               <a:solidFill>
@@ -7395,8 +7297,8 @@
           </a:p>
         </p:txBody>
       </p:sp>
-      <mc:AlternateContent xmlns:mc="http://schemas.openxmlformats.org/markup-compatibility/2006">
-        <mc:Choice xmlns:a14="http://schemas.microsoft.com/office/drawing/2010/main" Requires="a14">
+      <mc:AlternateContent xmlns:mc="http://schemas.openxmlformats.org/markup-compatibility/2006" xmlns:a14="http://schemas.microsoft.com/office/drawing/2010/main">
+        <mc:Choice Requires="a14">
           <p:sp>
             <p:nvSpPr>
               <p:cNvPr id="22" name="Flowchart: Process 21"/>
@@ -7502,7 +7404,7 @@
             </p:txBody>
           </p:sp>
         </mc:Choice>
-        <mc:Fallback>
+        <mc:Fallback xmlns="">
           <p:sp>
             <p:nvSpPr>
               <p:cNvPr id="22" name="Flowchart: Process 21"/>
@@ -7756,23 +7658,7 @@
                   <a:schemeClr val="tx1"/>
                 </a:solidFill>
               </a:rPr>
-              <a:t>Save </a:t>
-            </a:r>
-            <a:r>
-              <a:rPr lang="en-US" sz="2800" dirty="0" smtClean="0">
-                <a:solidFill>
-                  <a:schemeClr val="tx1"/>
-                </a:solidFill>
-              </a:rPr>
-              <a:t>posterior of each method </a:t>
-            </a:r>
-            <a:r>
-              <a:rPr lang="en-US" sz="2800" dirty="0" smtClean="0">
-                <a:solidFill>
-                  <a:schemeClr val="tx1"/>
-                </a:solidFill>
-              </a:rPr>
-              <a:t>for comparison</a:t>
+              <a:t>Save posterior of each method for comparison</a:t>
             </a:r>
             <a:endParaRPr lang="en-ZA" sz="2800" dirty="0">
               <a:solidFill>
@@ -7903,8 +7789,8 @@
           </a:p>
         </p:txBody>
       </p:sp>
-      <mc:AlternateContent xmlns:mc="http://schemas.openxmlformats.org/markup-compatibility/2006">
-        <mc:Choice xmlns:a14="http://schemas.microsoft.com/office/drawing/2010/main" Requires="a14">
+      <mc:AlternateContent xmlns:mc="http://schemas.openxmlformats.org/markup-compatibility/2006" xmlns:a14="http://schemas.microsoft.com/office/drawing/2010/main">
+        <mc:Choice Requires="a14">
           <p:sp>
             <p:nvSpPr>
               <p:cNvPr id="5" name="Content Placeholder 4"/>
@@ -8055,7 +7941,7 @@
             </p:txBody>
           </p:sp>
         </mc:Choice>
-        <mc:Fallback>
+        <mc:Fallback xmlns="">
           <p:sp>
             <p:nvSpPr>
               <p:cNvPr id="5" name="Content Placeholder 4"/>

</xml_diff>